<commit_message>
css class review style element
</commit_message>
<xml_diff>
--- a/MoreCss/CssReview.pptx
+++ b/MoreCss/CssReview.pptx
@@ -5,7 +5,7 @@
     <p:sldMasterId id="2147483676" r:id="rId1"/>
   </p:sldMasterIdLst>
   <p:notesMasterIdLst>
-    <p:notesMasterId r:id="rId14"/>
+    <p:notesMasterId r:id="rId13"/>
   </p:notesMasterIdLst>
   <p:sldIdLst>
     <p:sldId id="256" r:id="rId2"/>
@@ -13,32 +13,31 @@
     <p:sldId id="305" r:id="rId4"/>
     <p:sldId id="310" r:id="rId5"/>
     <p:sldId id="307" r:id="rId6"/>
-    <p:sldId id="303" r:id="rId7"/>
-    <p:sldId id="311" r:id="rId8"/>
-    <p:sldId id="308" r:id="rId9"/>
-    <p:sldId id="304" r:id="rId10"/>
-    <p:sldId id="306" r:id="rId11"/>
-    <p:sldId id="309" r:id="rId12"/>
-    <p:sldId id="312" r:id="rId13"/>
+    <p:sldId id="311" r:id="rId7"/>
+    <p:sldId id="308" r:id="rId8"/>
+    <p:sldId id="304" r:id="rId9"/>
+    <p:sldId id="306" r:id="rId10"/>
+    <p:sldId id="309" r:id="rId11"/>
+    <p:sldId id="312" r:id="rId12"/>
   </p:sldIdLst>
   <p:sldSz cx="9144000" cy="5143500" type="screen16x9"/>
   <p:notesSz cx="6858000" cy="9144000"/>
   <p:embeddedFontLst>
     <p:embeddedFont>
       <p:font typeface="Consolas" panose="020B0609020204030204" pitchFamily="49" charset="0"/>
-      <p:regular r:id="rId15"/>
-      <p:bold r:id="rId16"/>
-      <p:italic r:id="rId17"/>
-      <p:boldItalic r:id="rId18"/>
+      <p:regular r:id="rId14"/>
+      <p:bold r:id="rId15"/>
+      <p:italic r:id="rId16"/>
+      <p:boldItalic r:id="rId17"/>
     </p:embeddedFont>
     <p:embeddedFont>
       <p:font typeface="Krona One" panose="020B0604020202020204" charset="0"/>
-      <p:regular r:id="rId19"/>
+      <p:regular r:id="rId18"/>
     </p:embeddedFont>
     <p:embeddedFont>
       <p:font typeface="Miriam Libre" panose="00000500000000000000" pitchFamily="2" charset="-79"/>
-      <p:regular r:id="rId20"/>
-      <p:bold r:id="rId21"/>
+      <p:regular r:id="rId19"/>
+      <p:bold r:id="rId20"/>
     </p:embeddedFont>
   </p:embeddedFontLst>
   <p:defaultTextStyle>
@@ -982,7 +981,7 @@
     </p:spTree>
     <p:extLst>
       <p:ext uri="{BB962C8B-B14F-4D97-AF65-F5344CB8AC3E}">
-        <p14:creationId xmlns:p14="http://schemas.microsoft.com/office/powerpoint/2010/main" val="2321657043"/>
+        <p14:creationId xmlns:p14="http://schemas.microsoft.com/office/powerpoint/2010/main" val="4237640606"/>
       </p:ext>
     </p:extLst>
   </p:cSld>
@@ -993,140 +992,6 @@
 </file>
 
 <file path=ppt/notesSlides/notesSlide11.xml><?xml version="1.0" encoding="utf-8"?>
-<p:notes xmlns:a="http://schemas.openxmlformats.org/drawingml/2006/main" xmlns:r="http://schemas.openxmlformats.org/officeDocument/2006/relationships" xmlns:p="http://schemas.openxmlformats.org/presentationml/2006/main" showMasterSp="0" showMasterPhAnim="0">
-  <p:cSld>
-    <p:spTree>
-      <p:nvGrpSpPr>
-        <p:cNvPr id="1" name="Shape 654"/>
-        <p:cNvGrpSpPr/>
-        <p:nvPr/>
-      </p:nvGrpSpPr>
-      <p:grpSpPr>
-        <a:xfrm>
-          <a:off x="0" y="0"/>
-          <a:ext cx="0" cy="0"/>
-          <a:chOff x="0" y="0"/>
-          <a:chExt cx="0" cy="0"/>
-        </a:xfrm>
-      </p:grpSpPr>
-      <p:sp>
-        <p:nvSpPr>
-          <p:cNvPr id="655" name="Google Shape;655;ge30e247bb5_0_498:notes"/>
-          <p:cNvSpPr>
-            <a:spLocks noGrp="1" noRot="1" noChangeAspect="1"/>
-          </p:cNvSpPr>
-          <p:nvPr>
-            <p:ph type="sldImg" idx="2"/>
-          </p:nvPr>
-        </p:nvSpPr>
-        <p:spPr>
-          <a:xfrm>
-            <a:off x="381000" y="685800"/>
-            <a:ext cx="6096000" cy="3429000"/>
-          </a:xfrm>
-          <a:custGeom>
-            <a:avLst/>
-            <a:gdLst/>
-            <a:ahLst/>
-            <a:cxnLst/>
-            <a:rect l="l" t="t" r="r" b="b"/>
-            <a:pathLst>
-              <a:path w="120000" h="120000" extrusionOk="0">
-                <a:moveTo>
-                  <a:pt x="0" y="0"/>
-                </a:moveTo>
-                <a:lnTo>
-                  <a:pt x="120000" y="0"/>
-                </a:lnTo>
-                <a:lnTo>
-                  <a:pt x="120000" y="120000"/>
-                </a:lnTo>
-                <a:lnTo>
-                  <a:pt x="0" y="120000"/>
-                </a:lnTo>
-                <a:close/>
-              </a:path>
-            </a:pathLst>
-          </a:custGeom>
-        </p:spPr>
-      </p:sp>
-      <p:sp>
-        <p:nvSpPr>
-          <p:cNvPr id="656" name="Google Shape;656;ge30e247bb5_0_498:notes"/>
-          <p:cNvSpPr txBox="1">
-            <a:spLocks noGrp="1"/>
-          </p:cNvSpPr>
-          <p:nvPr>
-            <p:ph type="body" idx="1"/>
-          </p:nvPr>
-        </p:nvSpPr>
-        <p:spPr>
-          <a:xfrm>
-            <a:off x="685800" y="4343400"/>
-            <a:ext cx="5486400" cy="4114800"/>
-          </a:xfrm>
-          <a:prstGeom prst="rect">
-            <a:avLst/>
-          </a:prstGeom>
-        </p:spPr>
-        <p:txBody>
-          <a:bodyPr spcFirstLastPara="1" wrap="square" lIns="91425" tIns="91425" rIns="91425" bIns="91425" anchor="t" anchorCtr="0">
-            <a:noAutofit/>
-          </a:bodyPr>
-          <a:lstStyle/>
-          <a:p>
-            <a:pPr marL="0" marR="0" lvl="0" indent="0" algn="l" defTabSz="914400" rtl="0" eaLnBrk="1" fontAlgn="auto" latinLnBrk="0" hangingPunct="1">
-              <a:lnSpc>
-                <a:spcPct val="100000"/>
-              </a:lnSpc>
-              <a:spcBef>
-                <a:spcPts val="0"/>
-              </a:spcBef>
-              <a:spcAft>
-                <a:spcPts val="0"/>
-              </a:spcAft>
-              <a:buClr>
-                <a:srgbClr val="000000"/>
-              </a:buClr>
-              <a:buSzPts val="1100"/>
-              <a:buFont typeface="Arial"/>
-              <a:buNone/>
-              <a:tabLst/>
-              <a:defRPr/>
-            </a:pPr>
-            <a:r>
-              <a:rPr lang="en-US" dirty="0"/>
-              <a:t>Ask the students this question to see if they know the answer.</a:t>
-            </a:r>
-          </a:p>
-          <a:p>
-            <a:pPr marL="0" lvl="0" indent="0" algn="l" rtl="0">
-              <a:spcBef>
-                <a:spcPts val="0"/>
-              </a:spcBef>
-              <a:spcAft>
-                <a:spcPts val="0"/>
-              </a:spcAft>
-              <a:buNone/>
-            </a:pPr>
-            <a:endParaRPr dirty="0"/>
-          </a:p>
-        </p:txBody>
-      </p:sp>
-    </p:spTree>
-    <p:extLst>
-      <p:ext uri="{BB962C8B-B14F-4D97-AF65-F5344CB8AC3E}">
-        <p14:creationId xmlns:p14="http://schemas.microsoft.com/office/powerpoint/2010/main" val="4237640606"/>
-      </p:ext>
-    </p:extLst>
-  </p:cSld>
-  <p:clrMapOvr>
-    <a:masterClrMapping/>
-  </p:clrMapOvr>
-</p:notes>
-</file>
-
-<file path=ppt/notesSlides/notesSlide12.xml><?xml version="1.0" encoding="utf-8"?>
 <p:notes xmlns:a="http://schemas.openxmlformats.org/drawingml/2006/main" xmlns:r="http://schemas.openxmlformats.org/officeDocument/2006/relationships" xmlns:p="http://schemas.openxmlformats.org/presentationml/2006/main" showMasterSp="0" showMasterPhAnim="0">
   <p:cSld>
     <p:spTree>
@@ -1915,7 +1780,7 @@
     </p:spTree>
     <p:extLst>
       <p:ext uri="{BB962C8B-B14F-4D97-AF65-F5344CB8AC3E}">
-        <p14:creationId xmlns:p14="http://schemas.microsoft.com/office/powerpoint/2010/main" val="4178232342"/>
+        <p14:creationId xmlns:p14="http://schemas.microsoft.com/office/powerpoint/2010/main" val="3041285228"/>
       </p:ext>
     </p:extLst>
   </p:cSld>
@@ -2049,7 +1914,7 @@
     </p:spTree>
     <p:extLst>
       <p:ext uri="{BB962C8B-B14F-4D97-AF65-F5344CB8AC3E}">
-        <p14:creationId xmlns:p14="http://schemas.microsoft.com/office/powerpoint/2010/main" val="3041285228"/>
+        <p14:creationId xmlns:p14="http://schemas.microsoft.com/office/powerpoint/2010/main" val="3113224406"/>
       </p:ext>
     </p:extLst>
   </p:cSld>
@@ -2183,7 +2048,7 @@
     </p:spTree>
     <p:extLst>
       <p:ext uri="{BB962C8B-B14F-4D97-AF65-F5344CB8AC3E}">
-        <p14:creationId xmlns:p14="http://schemas.microsoft.com/office/powerpoint/2010/main" val="3113224406"/>
+        <p14:creationId xmlns:p14="http://schemas.microsoft.com/office/powerpoint/2010/main" val="3974892114"/>
       </p:ext>
     </p:extLst>
   </p:cSld>
@@ -2317,7 +2182,7 @@
     </p:spTree>
     <p:extLst>
       <p:ext uri="{BB962C8B-B14F-4D97-AF65-F5344CB8AC3E}">
-        <p14:creationId xmlns:p14="http://schemas.microsoft.com/office/powerpoint/2010/main" val="3974892114"/>
+        <p14:creationId xmlns:p14="http://schemas.microsoft.com/office/powerpoint/2010/main" val="2321657043"/>
       </p:ext>
     </p:extLst>
   </p:cSld>
@@ -9699,759 +9564,6 @@
         </p:nvSpPr>
         <p:spPr>
           <a:xfrm>
-            <a:off x="678643" y="511568"/>
-            <a:ext cx="7980675" cy="477552"/>
-          </a:xfrm>
-          <a:prstGeom prst="rect">
-            <a:avLst/>
-          </a:prstGeom>
-        </p:spPr>
-        <p:txBody>
-          <a:bodyPr spcFirstLastPara="1" wrap="square" lIns="91425" tIns="91425" rIns="91425" bIns="91425" anchor="t" anchorCtr="0">
-            <a:noAutofit/>
-          </a:bodyPr>
-          <a:lstStyle/>
-          <a:p>
-            <a:pPr lvl="0"/>
-            <a:r>
-              <a:rPr lang="en-US" sz="1600" dirty="0"/>
-              <a:t>Which CSS selector could select this element in CSS?</a:t>
-            </a:r>
-          </a:p>
-        </p:txBody>
-      </p:sp>
-      <p:sp>
-        <p:nvSpPr>
-          <p:cNvPr id="3" name="Rectangle 2">
-            <a:extLst>
-              <a:ext uri="{FF2B5EF4-FFF2-40B4-BE49-F238E27FC236}">
-                <a16:creationId xmlns:a16="http://schemas.microsoft.com/office/drawing/2014/main" id="{3164A431-FFA0-4BAC-9181-B8C0248E5E58}"/>
-              </a:ext>
-            </a:extLst>
-          </p:cNvPr>
-          <p:cNvSpPr/>
-          <p:nvPr/>
-        </p:nvSpPr>
-        <p:spPr>
-          <a:xfrm>
-            <a:off x="622997" y="2833633"/>
-            <a:ext cx="3788228" cy="696267"/>
-          </a:xfrm>
-          <a:prstGeom prst="rect">
-            <a:avLst/>
-          </a:prstGeom>
-        </p:spPr>
-        <p:style>
-          <a:lnRef idx="2">
-            <a:schemeClr val="accent1">
-              <a:shade val="50000"/>
-            </a:schemeClr>
-          </a:lnRef>
-          <a:fillRef idx="1">
-            <a:schemeClr val="accent1"/>
-          </a:fillRef>
-          <a:effectRef idx="0">
-            <a:schemeClr val="accent1"/>
-          </a:effectRef>
-          <a:fontRef idx="minor">
-            <a:schemeClr val="lt1"/>
-          </a:fontRef>
-        </p:style>
-        <p:txBody>
-          <a:bodyPr rtlCol="0" anchor="ctr"/>
-          <a:lstStyle/>
-          <a:p>
-            <a:pPr algn="ctr"/>
-            <a:r>
-              <a:rPr kumimoji="0" lang="en-US" sz="2800" b="1" i="0" u="none" strike="noStrike" kern="0" cap="none" spc="0" normalizeH="0" baseline="0" noProof="0" dirty="0">
-                <a:ln>
-                  <a:noFill/>
-                </a:ln>
-                <a:solidFill>
-                  <a:srgbClr val="000000"/>
-                </a:solidFill>
-                <a:effectLst/>
-                <a:uLnTx/>
-                <a:uFillTx/>
-                <a:latin typeface="Krona One"/>
-                <a:sym typeface="Krona One"/>
-              </a:rPr>
-              <a:t>A. .h1</a:t>
-            </a:r>
-            <a:endParaRPr lang="en-US" dirty="0"/>
-          </a:p>
-        </p:txBody>
-      </p:sp>
-      <p:sp>
-        <p:nvSpPr>
-          <p:cNvPr id="8" name="Rectangle 7">
-            <a:extLst>
-              <a:ext uri="{FF2B5EF4-FFF2-40B4-BE49-F238E27FC236}">
-                <a16:creationId xmlns:a16="http://schemas.microsoft.com/office/drawing/2014/main" id="{14616292-B763-4E75-9FDE-B667351A134B}"/>
-              </a:ext>
-            </a:extLst>
-          </p:cNvPr>
-          <p:cNvSpPr/>
-          <p:nvPr/>
-        </p:nvSpPr>
-        <p:spPr>
-          <a:xfrm>
-            <a:off x="4732774" y="2833633"/>
-            <a:ext cx="3788228" cy="696267"/>
-          </a:xfrm>
-          <a:prstGeom prst="rect">
-            <a:avLst/>
-          </a:prstGeom>
-        </p:spPr>
-        <p:style>
-          <a:lnRef idx="2">
-            <a:schemeClr val="accent2">
-              <a:shade val="50000"/>
-            </a:schemeClr>
-          </a:lnRef>
-          <a:fillRef idx="1">
-            <a:schemeClr val="accent2"/>
-          </a:fillRef>
-          <a:effectRef idx="0">
-            <a:schemeClr val="accent2"/>
-          </a:effectRef>
-          <a:fontRef idx="minor">
-            <a:schemeClr val="lt1"/>
-          </a:fontRef>
-        </p:style>
-        <p:txBody>
-          <a:bodyPr rtlCol="0" anchor="ctr"/>
-          <a:lstStyle/>
-          <a:p>
-            <a:pPr algn="ctr"/>
-            <a:r>
-              <a:rPr kumimoji="0" lang="en-US" sz="2800" b="1" i="0" u="none" strike="noStrike" kern="0" cap="none" spc="0" normalizeH="0" baseline="0" noProof="0" dirty="0">
-                <a:ln>
-                  <a:noFill/>
-                </a:ln>
-                <a:solidFill>
-                  <a:srgbClr val="000000"/>
-                </a:solidFill>
-                <a:effectLst/>
-                <a:uLnTx/>
-                <a:uFillTx/>
-                <a:latin typeface="Krona One"/>
-                <a:sym typeface="Krona One"/>
-              </a:rPr>
-              <a:t>B. .large</a:t>
-            </a:r>
-            <a:endParaRPr lang="en-US" dirty="0"/>
-          </a:p>
-        </p:txBody>
-      </p:sp>
-      <p:sp>
-        <p:nvSpPr>
-          <p:cNvPr id="9" name="Rectangle 8">
-            <a:extLst>
-              <a:ext uri="{FF2B5EF4-FFF2-40B4-BE49-F238E27FC236}">
-                <a16:creationId xmlns:a16="http://schemas.microsoft.com/office/drawing/2014/main" id="{3A325A3C-013D-4AEC-B7D3-B9F83FC398EA}"/>
-              </a:ext>
-            </a:extLst>
-          </p:cNvPr>
-          <p:cNvSpPr/>
-          <p:nvPr/>
-        </p:nvSpPr>
-        <p:spPr>
-          <a:xfrm>
-            <a:off x="622998" y="3766876"/>
-            <a:ext cx="3788228" cy="696267"/>
-          </a:xfrm>
-          <a:prstGeom prst="rect">
-            <a:avLst/>
-          </a:prstGeom>
-        </p:spPr>
-        <p:style>
-          <a:lnRef idx="2">
-            <a:schemeClr val="accent3">
-              <a:shade val="50000"/>
-            </a:schemeClr>
-          </a:lnRef>
-          <a:fillRef idx="1">
-            <a:schemeClr val="accent3"/>
-          </a:fillRef>
-          <a:effectRef idx="0">
-            <a:schemeClr val="accent3"/>
-          </a:effectRef>
-          <a:fontRef idx="minor">
-            <a:schemeClr val="lt1"/>
-          </a:fontRef>
-        </p:style>
-        <p:txBody>
-          <a:bodyPr rtlCol="0" anchor="ctr"/>
-          <a:lstStyle/>
-          <a:p>
-            <a:pPr algn="ctr"/>
-            <a:r>
-              <a:rPr kumimoji="0" lang="en-US" sz="2800" b="1" i="0" u="none" strike="noStrike" kern="0" cap="none" spc="0" normalizeH="0" baseline="0" noProof="0" dirty="0">
-                <a:ln>
-                  <a:noFill/>
-                </a:ln>
-                <a:solidFill>
-                  <a:srgbClr val="000000"/>
-                </a:solidFill>
-                <a:effectLst/>
-                <a:uLnTx/>
-                <a:uFillTx/>
-                <a:latin typeface="Krona One"/>
-                <a:sym typeface="Krona One"/>
-              </a:rPr>
-              <a:t>C. .Big H2</a:t>
-            </a:r>
-            <a:endParaRPr lang="en-US" dirty="0"/>
-          </a:p>
-        </p:txBody>
-      </p:sp>
-      <p:sp>
-        <p:nvSpPr>
-          <p:cNvPr id="10" name="Rectangle 9">
-            <a:extLst>
-              <a:ext uri="{FF2B5EF4-FFF2-40B4-BE49-F238E27FC236}">
-                <a16:creationId xmlns:a16="http://schemas.microsoft.com/office/drawing/2014/main" id="{1555D6F1-AFE4-4EDF-BC8B-4F3C9ACD659F}"/>
-              </a:ext>
-            </a:extLst>
-          </p:cNvPr>
-          <p:cNvSpPr/>
-          <p:nvPr/>
-        </p:nvSpPr>
-        <p:spPr>
-          <a:xfrm>
-            <a:off x="4732774" y="3766875"/>
-            <a:ext cx="3788228" cy="696267"/>
-          </a:xfrm>
-          <a:prstGeom prst="rect">
-            <a:avLst/>
-          </a:prstGeom>
-          <a:solidFill>
-            <a:schemeClr val="accent4">
-              <a:lumMod val="20000"/>
-              <a:lumOff val="80000"/>
-            </a:schemeClr>
-          </a:solidFill>
-          <a:ln>
-            <a:solidFill>
-              <a:schemeClr val="accent4">
-                <a:lumMod val="60000"/>
-                <a:lumOff val="40000"/>
-              </a:schemeClr>
-            </a:solidFill>
-          </a:ln>
-        </p:spPr>
-        <p:style>
-          <a:lnRef idx="2">
-            <a:schemeClr val="accent4">
-              <a:shade val="50000"/>
-            </a:schemeClr>
-          </a:lnRef>
-          <a:fillRef idx="1">
-            <a:schemeClr val="accent4"/>
-          </a:fillRef>
-          <a:effectRef idx="0">
-            <a:schemeClr val="accent4"/>
-          </a:effectRef>
-          <a:fontRef idx="minor">
-            <a:schemeClr val="lt1"/>
-          </a:fontRef>
-        </p:style>
-        <p:txBody>
-          <a:bodyPr rtlCol="0" anchor="ctr"/>
-          <a:lstStyle/>
-          <a:p>
-            <a:pPr algn="ctr"/>
-            <a:r>
-              <a:rPr kumimoji="0" lang="en-US" sz="2800" b="1" i="0" u="none" strike="noStrike" kern="0" cap="none" spc="0" normalizeH="0" baseline="0" noProof="0" dirty="0">
-                <a:ln>
-                  <a:noFill/>
-                </a:ln>
-                <a:solidFill>
-                  <a:srgbClr val="000000"/>
-                </a:solidFill>
-                <a:effectLst/>
-                <a:uLnTx/>
-                <a:uFillTx/>
-                <a:latin typeface="Krona One"/>
-                <a:sym typeface="Krona One"/>
-              </a:rPr>
-              <a:t>D. #large</a:t>
-            </a:r>
-            <a:endParaRPr lang="en-US" dirty="0"/>
-          </a:p>
-        </p:txBody>
-      </p:sp>
-      <p:sp>
-        <p:nvSpPr>
-          <p:cNvPr id="4" name="Rectangle 3">
-            <a:extLst>
-              <a:ext uri="{FF2B5EF4-FFF2-40B4-BE49-F238E27FC236}">
-                <a16:creationId xmlns:a16="http://schemas.microsoft.com/office/drawing/2014/main" id="{8252FAC5-4990-49E2-A2F6-9ED1220649FD}"/>
-              </a:ext>
-            </a:extLst>
-          </p:cNvPr>
-          <p:cNvSpPr/>
-          <p:nvPr/>
-        </p:nvSpPr>
-        <p:spPr>
-          <a:xfrm>
-            <a:off x="4732774" y="2833633"/>
-            <a:ext cx="3788228" cy="687434"/>
-          </a:xfrm>
-          <a:custGeom>
-            <a:avLst/>
-            <a:gdLst>
-              <a:gd name="connsiteX0" fmla="*/ 0 w 3788228"/>
-              <a:gd name="connsiteY0" fmla="*/ 0 h 687434"/>
-              <a:gd name="connsiteX1" fmla="*/ 593489 w 3788228"/>
-              <a:gd name="connsiteY1" fmla="*/ 0 h 687434"/>
-              <a:gd name="connsiteX2" fmla="*/ 1111214 w 3788228"/>
-              <a:gd name="connsiteY2" fmla="*/ 0 h 687434"/>
-              <a:gd name="connsiteX3" fmla="*/ 1818349 w 3788228"/>
-              <a:gd name="connsiteY3" fmla="*/ 0 h 687434"/>
-              <a:gd name="connsiteX4" fmla="*/ 2411838 w 3788228"/>
-              <a:gd name="connsiteY4" fmla="*/ 0 h 687434"/>
-              <a:gd name="connsiteX5" fmla="*/ 3005328 w 3788228"/>
-              <a:gd name="connsiteY5" fmla="*/ 0 h 687434"/>
-              <a:gd name="connsiteX6" fmla="*/ 3788228 w 3788228"/>
-              <a:gd name="connsiteY6" fmla="*/ 0 h 687434"/>
-              <a:gd name="connsiteX7" fmla="*/ 3788228 w 3788228"/>
-              <a:gd name="connsiteY7" fmla="*/ 687434 h 687434"/>
-              <a:gd name="connsiteX8" fmla="*/ 3156857 w 3788228"/>
-              <a:gd name="connsiteY8" fmla="*/ 687434 h 687434"/>
-              <a:gd name="connsiteX9" fmla="*/ 2639132 w 3788228"/>
-              <a:gd name="connsiteY9" fmla="*/ 687434 h 687434"/>
-              <a:gd name="connsiteX10" fmla="*/ 2007761 w 3788228"/>
-              <a:gd name="connsiteY10" fmla="*/ 687434 h 687434"/>
-              <a:gd name="connsiteX11" fmla="*/ 1376390 w 3788228"/>
-              <a:gd name="connsiteY11" fmla="*/ 687434 h 687434"/>
-              <a:gd name="connsiteX12" fmla="*/ 782900 w 3788228"/>
-              <a:gd name="connsiteY12" fmla="*/ 687434 h 687434"/>
-              <a:gd name="connsiteX13" fmla="*/ 0 w 3788228"/>
-              <a:gd name="connsiteY13" fmla="*/ 687434 h 687434"/>
-              <a:gd name="connsiteX14" fmla="*/ 0 w 3788228"/>
-              <a:gd name="connsiteY14" fmla="*/ 0 h 687434"/>
-            </a:gdLst>
-            <a:ahLst/>
-            <a:cxnLst>
-              <a:cxn ang="0">
-                <a:pos x="connsiteX0" y="connsiteY0"/>
-              </a:cxn>
-              <a:cxn ang="0">
-                <a:pos x="connsiteX1" y="connsiteY1"/>
-              </a:cxn>
-              <a:cxn ang="0">
-                <a:pos x="connsiteX2" y="connsiteY2"/>
-              </a:cxn>
-              <a:cxn ang="0">
-                <a:pos x="connsiteX3" y="connsiteY3"/>
-              </a:cxn>
-              <a:cxn ang="0">
-                <a:pos x="connsiteX4" y="connsiteY4"/>
-              </a:cxn>
-              <a:cxn ang="0">
-                <a:pos x="connsiteX5" y="connsiteY5"/>
-              </a:cxn>
-              <a:cxn ang="0">
-                <a:pos x="connsiteX6" y="connsiteY6"/>
-              </a:cxn>
-              <a:cxn ang="0">
-                <a:pos x="connsiteX7" y="connsiteY7"/>
-              </a:cxn>
-              <a:cxn ang="0">
-                <a:pos x="connsiteX8" y="connsiteY8"/>
-              </a:cxn>
-              <a:cxn ang="0">
-                <a:pos x="connsiteX9" y="connsiteY9"/>
-              </a:cxn>
-              <a:cxn ang="0">
-                <a:pos x="connsiteX10" y="connsiteY10"/>
-              </a:cxn>
-              <a:cxn ang="0">
-                <a:pos x="connsiteX11" y="connsiteY11"/>
-              </a:cxn>
-              <a:cxn ang="0">
-                <a:pos x="connsiteX12" y="connsiteY12"/>
-              </a:cxn>
-              <a:cxn ang="0">
-                <a:pos x="connsiteX13" y="connsiteY13"/>
-              </a:cxn>
-              <a:cxn ang="0">
-                <a:pos x="connsiteX14" y="connsiteY14"/>
-              </a:cxn>
-            </a:cxnLst>
-            <a:rect l="l" t="t" r="r" b="b"/>
-            <a:pathLst>
-              <a:path w="3788228" h="687434" extrusionOk="0">
-                <a:moveTo>
-                  <a:pt x="0" y="0"/>
-                </a:moveTo>
-                <a:cubicBezTo>
-                  <a:pt x="287109" y="-16378"/>
-                  <a:pt x="367211" y="1011"/>
-                  <a:pt x="593489" y="0"/>
-                </a:cubicBezTo>
-                <a:cubicBezTo>
-                  <a:pt x="819767" y="-1011"/>
-                  <a:pt x="912247" y="-3035"/>
-                  <a:pt x="1111214" y="0"/>
-                </a:cubicBezTo>
-                <a:cubicBezTo>
-                  <a:pt x="1310182" y="3035"/>
-                  <a:pt x="1579259" y="-30071"/>
-                  <a:pt x="1818349" y="0"/>
-                </a:cubicBezTo>
-                <a:cubicBezTo>
-                  <a:pt x="2057439" y="30071"/>
-                  <a:pt x="2199489" y="-22663"/>
-                  <a:pt x="2411838" y="0"/>
-                </a:cubicBezTo>
-                <a:cubicBezTo>
-                  <a:pt x="2624187" y="22663"/>
-                  <a:pt x="2802775" y="17073"/>
-                  <a:pt x="3005328" y="0"/>
-                </a:cubicBezTo>
-                <a:cubicBezTo>
-                  <a:pt x="3207881" y="-17073"/>
-                  <a:pt x="3495250" y="18076"/>
-                  <a:pt x="3788228" y="0"/>
-                </a:cubicBezTo>
-                <a:cubicBezTo>
-                  <a:pt x="3766823" y="162221"/>
-                  <a:pt x="3806156" y="523150"/>
-                  <a:pt x="3788228" y="687434"/>
-                </a:cubicBezTo>
-                <a:cubicBezTo>
-                  <a:pt x="3502728" y="698073"/>
-                  <a:pt x="3340185" y="663617"/>
-                  <a:pt x="3156857" y="687434"/>
-                </a:cubicBezTo>
-                <a:cubicBezTo>
-                  <a:pt x="2973529" y="711251"/>
-                  <a:pt x="2813019" y="709531"/>
-                  <a:pt x="2639132" y="687434"/>
-                </a:cubicBezTo>
-                <a:cubicBezTo>
-                  <a:pt x="2465245" y="665337"/>
-                  <a:pt x="2172834" y="710767"/>
-                  <a:pt x="2007761" y="687434"/>
-                </a:cubicBezTo>
-                <a:cubicBezTo>
-                  <a:pt x="1842688" y="664101"/>
-                  <a:pt x="1512714" y="665596"/>
-                  <a:pt x="1376390" y="687434"/>
-                </a:cubicBezTo>
-                <a:cubicBezTo>
-                  <a:pt x="1240066" y="709272"/>
-                  <a:pt x="945395" y="693339"/>
-                  <a:pt x="782900" y="687434"/>
-                </a:cubicBezTo>
-                <a:cubicBezTo>
-                  <a:pt x="620405" y="681530"/>
-                  <a:pt x="192470" y="706085"/>
-                  <a:pt x="0" y="687434"/>
-                </a:cubicBezTo>
-                <a:cubicBezTo>
-                  <a:pt x="-32086" y="522160"/>
-                  <a:pt x="-25717" y="253293"/>
-                  <a:pt x="0" y="0"/>
-                </a:cubicBezTo>
-                <a:close/>
-              </a:path>
-            </a:pathLst>
-          </a:custGeom>
-          <a:noFill/>
-          <a:ln w="127000">
-            <a:solidFill>
-              <a:srgbClr val="FFFF00"/>
-            </a:solidFill>
-            <a:prstDash val="solid"/>
-            <a:extLst>
-              <a:ext uri="{C807C97D-BFC1-408E-A445-0C87EB9F89A2}">
-                <ask:lineSketchStyleProps xmlns:ask="http://schemas.microsoft.com/office/drawing/2018/sketchyshapes" sd="1219033472">
-                  <a:prstGeom prst="rect">
-                    <a:avLst/>
-                  </a:prstGeom>
-                  <ask:type>
-                    <ask:lineSketchFreehand/>
-                  </ask:type>
-                </ask:lineSketchStyleProps>
-              </a:ext>
-            </a:extLst>
-          </a:ln>
-        </p:spPr>
-        <p:style>
-          <a:lnRef idx="2">
-            <a:schemeClr val="accent1">
-              <a:shade val="50000"/>
-            </a:schemeClr>
-          </a:lnRef>
-          <a:fillRef idx="1">
-            <a:schemeClr val="accent1"/>
-          </a:fillRef>
-          <a:effectRef idx="0">
-            <a:schemeClr val="accent1"/>
-          </a:effectRef>
-          <a:fontRef idx="minor">
-            <a:schemeClr val="lt1"/>
-          </a:fontRef>
-        </p:style>
-        <p:txBody>
-          <a:bodyPr rtlCol="0" anchor="ctr"/>
-          <a:lstStyle/>
-          <a:p>
-            <a:pPr algn="ctr"/>
-            <a:endParaRPr lang="en-US"/>
-          </a:p>
-        </p:txBody>
-      </p:sp>
-      <p:sp>
-        <p:nvSpPr>
-          <p:cNvPr id="11" name="TextBox 10">
-            <a:extLst>
-              <a:ext uri="{FF2B5EF4-FFF2-40B4-BE49-F238E27FC236}">
-                <a16:creationId xmlns:a16="http://schemas.microsoft.com/office/drawing/2014/main" id="{55FF4073-9704-40A4-A4C3-EBF8E2196701}"/>
-              </a:ext>
-            </a:extLst>
-          </p:cNvPr>
-          <p:cNvSpPr txBox="1"/>
-          <p:nvPr/>
-        </p:nvSpPr>
-        <p:spPr>
-          <a:xfrm>
-            <a:off x="758536" y="1699595"/>
-            <a:ext cx="7626927" cy="646331"/>
-          </a:xfrm>
-          <a:prstGeom prst="rect">
-            <a:avLst/>
-          </a:prstGeom>
-          <a:noFill/>
-        </p:spPr>
-        <p:txBody>
-          <a:bodyPr wrap="square">
-            <a:spAutoFit/>
-          </a:bodyPr>
-          <a:lstStyle/>
-          <a:p>
-            <a:r>
-              <a:rPr lang="en-US" sz="3600" b="0" dirty="0">
-                <a:solidFill>
-                  <a:srgbClr val="800000"/>
-                </a:solidFill>
-                <a:effectLst/>
-                <a:latin typeface="Consolas" panose="020B0609020204030204" pitchFamily="49" charset="0"/>
-              </a:rPr>
-              <a:t>&lt;h2</a:t>
-            </a:r>
-            <a:r>
-              <a:rPr lang="en-US" sz="3600" b="0" dirty="0">
-                <a:solidFill>
-                  <a:srgbClr val="000000"/>
-                </a:solidFill>
-                <a:effectLst/>
-                <a:latin typeface="Consolas" panose="020B0609020204030204" pitchFamily="49" charset="0"/>
-              </a:rPr>
-              <a:t> </a:t>
-            </a:r>
-            <a:r>
-              <a:rPr lang="en-US" sz="3600" b="0" dirty="0">
-                <a:solidFill>
-                  <a:srgbClr val="FF0000"/>
-                </a:solidFill>
-                <a:effectLst/>
-                <a:latin typeface="Consolas" panose="020B0609020204030204" pitchFamily="49" charset="0"/>
-              </a:rPr>
-              <a:t>class</a:t>
-            </a:r>
-            <a:r>
-              <a:rPr lang="en-US" sz="3600" b="0" dirty="0">
-                <a:solidFill>
-                  <a:srgbClr val="000000"/>
-                </a:solidFill>
-                <a:effectLst/>
-                <a:latin typeface="Consolas" panose="020B0609020204030204" pitchFamily="49" charset="0"/>
-              </a:rPr>
-              <a:t>=</a:t>
-            </a:r>
-            <a:r>
-              <a:rPr lang="en-US" sz="3600" b="0" dirty="0">
-                <a:solidFill>
-                  <a:srgbClr val="0000FF"/>
-                </a:solidFill>
-                <a:effectLst/>
-                <a:latin typeface="Consolas" panose="020B0609020204030204" pitchFamily="49" charset="0"/>
-              </a:rPr>
-              <a:t>"large"</a:t>
-            </a:r>
-            <a:r>
-              <a:rPr lang="en-US" sz="3600" b="0" dirty="0">
-                <a:solidFill>
-                  <a:srgbClr val="800000"/>
-                </a:solidFill>
-                <a:effectLst/>
-                <a:latin typeface="Consolas" panose="020B0609020204030204" pitchFamily="49" charset="0"/>
-              </a:rPr>
-              <a:t>&gt;</a:t>
-            </a:r>
-            <a:r>
-              <a:rPr lang="en-US" sz="3600" b="0" dirty="0">
-                <a:solidFill>
-                  <a:srgbClr val="000000"/>
-                </a:solidFill>
-                <a:effectLst/>
-                <a:latin typeface="Consolas" panose="020B0609020204030204" pitchFamily="49" charset="0"/>
-              </a:rPr>
-              <a:t>Big H2</a:t>
-            </a:r>
-            <a:r>
-              <a:rPr lang="en-US" sz="3600" b="0" dirty="0">
-                <a:solidFill>
-                  <a:srgbClr val="800000"/>
-                </a:solidFill>
-                <a:effectLst/>
-                <a:latin typeface="Consolas" panose="020B0609020204030204" pitchFamily="49" charset="0"/>
-              </a:rPr>
-              <a:t>&lt;/h2&gt;</a:t>
-            </a:r>
-            <a:endParaRPr lang="en-US" sz="3600" b="0" dirty="0">
-              <a:solidFill>
-                <a:srgbClr val="000000"/>
-              </a:solidFill>
-              <a:effectLst/>
-              <a:latin typeface="Consolas" panose="020B0609020204030204" pitchFamily="49" charset="0"/>
-            </a:endParaRPr>
-          </a:p>
-        </p:txBody>
-      </p:sp>
-    </p:spTree>
-    <p:extLst>
-      <p:ext uri="{BB962C8B-B14F-4D97-AF65-F5344CB8AC3E}">
-        <p14:creationId xmlns:p14="http://schemas.microsoft.com/office/powerpoint/2010/main" val="1819734752"/>
-      </p:ext>
-    </p:extLst>
-  </p:cSld>
-  <p:clrMapOvr>
-    <a:masterClrMapping/>
-  </p:clrMapOvr>
-  <p:timing>
-    <p:tnLst>
-      <p:par>
-        <p:cTn id="1" dur="indefinite" restart="never" nodeType="tmRoot">
-          <p:childTnLst>
-            <p:seq concurrent="1" nextAc="seek">
-              <p:cTn id="2" dur="indefinite" nodeType="mainSeq">
-                <p:childTnLst>
-                  <p:par>
-                    <p:cTn id="3" fill="hold">
-                      <p:stCondLst>
-                        <p:cond delay="indefinite"/>
-                      </p:stCondLst>
-                      <p:childTnLst>
-                        <p:par>
-                          <p:cTn id="4" fill="hold">
-                            <p:stCondLst>
-                              <p:cond delay="0"/>
-                            </p:stCondLst>
-                            <p:childTnLst>
-                              <p:par>
-                                <p:cTn id="5" presetID="10" presetClass="entr" presetSubtype="0" fill="hold" grpId="0" nodeType="clickEffect">
-                                  <p:stCondLst>
-                                    <p:cond delay="0"/>
-                                  </p:stCondLst>
-                                  <p:childTnLst>
-                                    <p:set>
-                                      <p:cBhvr>
-                                        <p:cTn id="6" dur="1" fill="hold">
-                                          <p:stCondLst>
-                                            <p:cond delay="0"/>
-                                          </p:stCondLst>
-                                        </p:cTn>
-                                        <p:tgtEl>
-                                          <p:spTgt spid="4"/>
-                                        </p:tgtEl>
-                                        <p:attrNameLst>
-                                          <p:attrName>style.visibility</p:attrName>
-                                        </p:attrNameLst>
-                                      </p:cBhvr>
-                                      <p:to>
-                                        <p:strVal val="visible"/>
-                                      </p:to>
-                                    </p:set>
-                                    <p:animEffect transition="in" filter="fade">
-                                      <p:cBhvr>
-                                        <p:cTn id="7" dur="500"/>
-                                        <p:tgtEl>
-                                          <p:spTgt spid="4"/>
-                                        </p:tgtEl>
-                                      </p:cBhvr>
-                                    </p:animEffect>
-                                  </p:childTnLst>
-                                </p:cTn>
-                              </p:par>
-                            </p:childTnLst>
-                          </p:cTn>
-                        </p:par>
-                      </p:childTnLst>
-                    </p:cTn>
-                  </p:par>
-                </p:childTnLst>
-              </p:cTn>
-              <p:prevCondLst>
-                <p:cond evt="onPrev" delay="0">
-                  <p:tgtEl>
-                    <p:sldTgt/>
-                  </p:tgtEl>
-                </p:cond>
-              </p:prevCondLst>
-              <p:nextCondLst>
-                <p:cond evt="onNext" delay="0">
-                  <p:tgtEl>
-                    <p:sldTgt/>
-                  </p:tgtEl>
-                </p:cond>
-              </p:nextCondLst>
-            </p:seq>
-          </p:childTnLst>
-        </p:cTn>
-      </p:par>
-    </p:tnLst>
-    <p:bldLst>
-      <p:bldP spid="4" grpId="0" animBg="1"/>
-    </p:bldLst>
-  </p:timing>
-</p:sld>
-</file>
-
-<file path=ppt/slides/slide11.xml><?xml version="1.0" encoding="utf-8"?>
-<p:sld xmlns:a="http://schemas.openxmlformats.org/drawingml/2006/main" xmlns:r="http://schemas.openxmlformats.org/officeDocument/2006/relationships" xmlns:p="http://schemas.openxmlformats.org/presentationml/2006/main">
-  <p:cSld>
-    <p:spTree>
-      <p:nvGrpSpPr>
-        <p:cNvPr id="1" name="Shape 657"/>
-        <p:cNvGrpSpPr/>
-        <p:nvPr/>
-      </p:nvGrpSpPr>
-      <p:grpSpPr>
-        <a:xfrm>
-          <a:off x="0" y="0"/>
-          <a:ext cx="0" cy="0"/>
-          <a:chOff x="0" y="0"/>
-          <a:chExt cx="0" cy="0"/>
-        </a:xfrm>
-      </p:grpSpPr>
-      <p:sp>
-        <p:nvSpPr>
-          <p:cNvPr id="658" name="Google Shape;658;p39"/>
-          <p:cNvSpPr txBox="1">
-            <a:spLocks noGrp="1"/>
-          </p:cNvSpPr>
-          <p:nvPr>
-            <p:ph type="title"/>
-          </p:nvPr>
-        </p:nvSpPr>
-        <p:spPr>
-          <a:xfrm>
             <a:off x="666465" y="490920"/>
             <a:ext cx="8458200" cy="477552"/>
           </a:xfrm>
@@ -11118,7 +10230,7 @@
 </p:sld>
 </file>
 
-<file path=ppt/slides/slide12.xml><?xml version="1.0" encoding="utf-8"?>
+<file path=ppt/slides/slide11.xml><?xml version="1.0" encoding="utf-8"?>
 <p:sld xmlns:a="http://schemas.openxmlformats.org/drawingml/2006/main" xmlns:r="http://schemas.openxmlformats.org/officeDocument/2006/relationships" xmlns:p="http://schemas.openxmlformats.org/presentationml/2006/main">
   <p:cSld>
     <p:spTree>
@@ -14637,698 +13749,6 @@
         </p:nvSpPr>
         <p:spPr>
           <a:xfrm>
-            <a:off x="539871" y="431325"/>
-            <a:ext cx="7898004" cy="572700"/>
-          </a:xfrm>
-          <a:prstGeom prst="rect">
-            <a:avLst/>
-          </a:prstGeom>
-        </p:spPr>
-        <p:txBody>
-          <a:bodyPr spcFirstLastPara="1" wrap="square" lIns="91425" tIns="91425" rIns="91425" bIns="91425" anchor="t" anchorCtr="0">
-            <a:noAutofit/>
-          </a:bodyPr>
-          <a:lstStyle/>
-          <a:p>
-            <a:pPr lvl="0"/>
-            <a:r>
-              <a:rPr lang="en-US" sz="2400" b="0" dirty="0"/>
-              <a:t>CSS files end with what file extension?</a:t>
-            </a:r>
-            <a:endParaRPr sz="2400" b="0" dirty="0"/>
-          </a:p>
-        </p:txBody>
-      </p:sp>
-      <p:sp>
-        <p:nvSpPr>
-          <p:cNvPr id="3" name="Rectangle 2">
-            <a:extLst>
-              <a:ext uri="{FF2B5EF4-FFF2-40B4-BE49-F238E27FC236}">
-                <a16:creationId xmlns:a16="http://schemas.microsoft.com/office/drawing/2014/main" id="{3164A431-FFA0-4BAC-9181-B8C0248E5E58}"/>
-              </a:ext>
-            </a:extLst>
-          </p:cNvPr>
-          <p:cNvSpPr/>
-          <p:nvPr/>
-        </p:nvSpPr>
-        <p:spPr>
-          <a:xfrm>
-            <a:off x="622998" y="1376624"/>
-            <a:ext cx="3788228" cy="1457011"/>
-          </a:xfrm>
-          <a:prstGeom prst="rect">
-            <a:avLst/>
-          </a:prstGeom>
-        </p:spPr>
-        <p:style>
-          <a:lnRef idx="2">
-            <a:schemeClr val="accent1">
-              <a:shade val="50000"/>
-            </a:schemeClr>
-          </a:lnRef>
-          <a:fillRef idx="1">
-            <a:schemeClr val="accent1"/>
-          </a:fillRef>
-          <a:effectRef idx="0">
-            <a:schemeClr val="accent1"/>
-          </a:effectRef>
-          <a:fontRef idx="minor">
-            <a:schemeClr val="lt1"/>
-          </a:fontRef>
-        </p:style>
-        <p:txBody>
-          <a:bodyPr rtlCol="0" anchor="ctr"/>
-          <a:lstStyle/>
-          <a:p>
-            <a:pPr algn="ctr"/>
-            <a:r>
-              <a:rPr kumimoji="0" lang="en-US" sz="2800" b="1" i="0" u="none" strike="noStrike" kern="0" cap="none" spc="0" normalizeH="0" baseline="0" noProof="0" dirty="0">
-                <a:ln>
-                  <a:noFill/>
-                </a:ln>
-                <a:solidFill>
-                  <a:srgbClr val="000000"/>
-                </a:solidFill>
-                <a:effectLst/>
-                <a:uLnTx/>
-                <a:uFillTx/>
-                <a:latin typeface="Krona One"/>
-                <a:sym typeface="Krona One"/>
-              </a:rPr>
-              <a:t>A. .html</a:t>
-            </a:r>
-            <a:endParaRPr lang="en-US" dirty="0"/>
-          </a:p>
-        </p:txBody>
-      </p:sp>
-      <p:sp>
-        <p:nvSpPr>
-          <p:cNvPr id="8" name="Rectangle 7">
-            <a:extLst>
-              <a:ext uri="{FF2B5EF4-FFF2-40B4-BE49-F238E27FC236}">
-                <a16:creationId xmlns:a16="http://schemas.microsoft.com/office/drawing/2014/main" id="{14616292-B763-4E75-9FDE-B667351A134B}"/>
-              </a:ext>
-            </a:extLst>
-          </p:cNvPr>
-          <p:cNvSpPr/>
-          <p:nvPr/>
-        </p:nvSpPr>
-        <p:spPr>
-          <a:xfrm>
-            <a:off x="4732774" y="1376623"/>
-            <a:ext cx="3788228" cy="1457011"/>
-          </a:xfrm>
-          <a:prstGeom prst="rect">
-            <a:avLst/>
-          </a:prstGeom>
-        </p:spPr>
-        <p:style>
-          <a:lnRef idx="2">
-            <a:schemeClr val="accent2">
-              <a:shade val="50000"/>
-            </a:schemeClr>
-          </a:lnRef>
-          <a:fillRef idx="1">
-            <a:schemeClr val="accent2"/>
-          </a:fillRef>
-          <a:effectRef idx="0">
-            <a:schemeClr val="accent2"/>
-          </a:effectRef>
-          <a:fontRef idx="minor">
-            <a:schemeClr val="lt1"/>
-          </a:fontRef>
-        </p:style>
-        <p:txBody>
-          <a:bodyPr rtlCol="0" anchor="ctr"/>
-          <a:lstStyle/>
-          <a:p>
-            <a:pPr algn="ctr"/>
-            <a:r>
-              <a:rPr kumimoji="0" lang="en-US" sz="2800" b="1" i="0" u="none" strike="noStrike" kern="0" cap="none" spc="0" normalizeH="0" baseline="0" noProof="0" dirty="0">
-                <a:ln>
-                  <a:noFill/>
-                </a:ln>
-                <a:solidFill>
-                  <a:srgbClr val="000000"/>
-                </a:solidFill>
-                <a:effectLst/>
-                <a:uLnTx/>
-                <a:uFillTx/>
-                <a:latin typeface="Krona One"/>
-                <a:sym typeface="Krona One"/>
-              </a:rPr>
-              <a:t>B. .txt</a:t>
-            </a:r>
-            <a:endParaRPr lang="en-US" dirty="0"/>
-          </a:p>
-        </p:txBody>
-      </p:sp>
-      <p:sp>
-        <p:nvSpPr>
-          <p:cNvPr id="9" name="Rectangle 8">
-            <a:extLst>
-              <a:ext uri="{FF2B5EF4-FFF2-40B4-BE49-F238E27FC236}">
-                <a16:creationId xmlns:a16="http://schemas.microsoft.com/office/drawing/2014/main" id="{3A325A3C-013D-4AEC-B7D3-B9F83FC398EA}"/>
-              </a:ext>
-            </a:extLst>
-          </p:cNvPr>
-          <p:cNvSpPr/>
-          <p:nvPr/>
-        </p:nvSpPr>
-        <p:spPr>
-          <a:xfrm>
-            <a:off x="622998" y="3006132"/>
-            <a:ext cx="3788228" cy="1457011"/>
-          </a:xfrm>
-          <a:prstGeom prst="rect">
-            <a:avLst/>
-          </a:prstGeom>
-        </p:spPr>
-        <p:style>
-          <a:lnRef idx="2">
-            <a:schemeClr val="accent3">
-              <a:shade val="50000"/>
-            </a:schemeClr>
-          </a:lnRef>
-          <a:fillRef idx="1">
-            <a:schemeClr val="accent3"/>
-          </a:fillRef>
-          <a:effectRef idx="0">
-            <a:schemeClr val="accent3"/>
-          </a:effectRef>
-          <a:fontRef idx="minor">
-            <a:schemeClr val="lt1"/>
-          </a:fontRef>
-        </p:style>
-        <p:txBody>
-          <a:bodyPr rtlCol="0" anchor="ctr"/>
-          <a:lstStyle/>
-          <a:p>
-            <a:pPr algn="ctr"/>
-            <a:r>
-              <a:rPr kumimoji="0" lang="en-US" sz="2800" b="1" i="0" u="none" strike="noStrike" kern="0" cap="none" spc="0" normalizeH="0" baseline="0" noProof="0" dirty="0">
-                <a:ln>
-                  <a:noFill/>
-                </a:ln>
-                <a:solidFill>
-                  <a:srgbClr val="000000"/>
-                </a:solidFill>
-                <a:effectLst/>
-                <a:uLnTx/>
-                <a:uFillTx/>
-                <a:latin typeface="Krona One"/>
-                <a:sym typeface="Krona One"/>
-              </a:rPr>
-              <a:t>C. .</a:t>
-            </a:r>
-            <a:r>
-              <a:rPr kumimoji="0" lang="en-US" sz="2800" b="1" i="0" u="none" strike="noStrike" kern="0" cap="none" spc="0" normalizeH="0" baseline="0" noProof="0" dirty="0" err="1">
-                <a:ln>
-                  <a:noFill/>
-                </a:ln>
-                <a:solidFill>
-                  <a:srgbClr val="000000"/>
-                </a:solidFill>
-                <a:effectLst/>
-                <a:uLnTx/>
-                <a:uFillTx/>
-                <a:latin typeface="Krona One"/>
-                <a:sym typeface="Krona One"/>
-              </a:rPr>
-              <a:t>css</a:t>
-            </a:r>
-            <a:endParaRPr lang="en-US" dirty="0"/>
-          </a:p>
-        </p:txBody>
-      </p:sp>
-      <p:sp>
-        <p:nvSpPr>
-          <p:cNvPr id="10" name="Rectangle 9">
-            <a:extLst>
-              <a:ext uri="{FF2B5EF4-FFF2-40B4-BE49-F238E27FC236}">
-                <a16:creationId xmlns:a16="http://schemas.microsoft.com/office/drawing/2014/main" id="{1555D6F1-AFE4-4EDF-BC8B-4F3C9ACD659F}"/>
-              </a:ext>
-            </a:extLst>
-          </p:cNvPr>
-          <p:cNvSpPr/>
-          <p:nvPr/>
-        </p:nvSpPr>
-        <p:spPr>
-          <a:xfrm>
-            <a:off x="4732774" y="3006131"/>
-            <a:ext cx="3788228" cy="1457011"/>
-          </a:xfrm>
-          <a:prstGeom prst="rect">
-            <a:avLst/>
-          </a:prstGeom>
-          <a:solidFill>
-            <a:schemeClr val="accent4">
-              <a:lumMod val="20000"/>
-              <a:lumOff val="80000"/>
-            </a:schemeClr>
-          </a:solidFill>
-          <a:ln>
-            <a:solidFill>
-              <a:schemeClr val="accent4">
-                <a:lumMod val="60000"/>
-                <a:lumOff val="40000"/>
-              </a:schemeClr>
-            </a:solidFill>
-          </a:ln>
-        </p:spPr>
-        <p:style>
-          <a:lnRef idx="2">
-            <a:schemeClr val="accent4">
-              <a:shade val="50000"/>
-            </a:schemeClr>
-          </a:lnRef>
-          <a:fillRef idx="1">
-            <a:schemeClr val="accent4"/>
-          </a:fillRef>
-          <a:effectRef idx="0">
-            <a:schemeClr val="accent4"/>
-          </a:effectRef>
-          <a:fontRef idx="minor">
-            <a:schemeClr val="lt1"/>
-          </a:fontRef>
-        </p:style>
-        <p:txBody>
-          <a:bodyPr rtlCol="0" anchor="ctr"/>
-          <a:lstStyle/>
-          <a:p>
-            <a:pPr algn="ctr"/>
-            <a:r>
-              <a:rPr kumimoji="0" lang="en-US" sz="2800" b="1" i="0" u="none" strike="noStrike" kern="0" cap="none" spc="0" normalizeH="0" baseline="0" noProof="0" dirty="0">
-                <a:ln>
-                  <a:noFill/>
-                </a:ln>
-                <a:solidFill>
-                  <a:srgbClr val="000000"/>
-                </a:solidFill>
-                <a:effectLst/>
-                <a:uLnTx/>
-                <a:uFillTx/>
-                <a:latin typeface="Krona One"/>
-                <a:sym typeface="Krona One"/>
-              </a:rPr>
-              <a:t>D. .ccs</a:t>
-            </a:r>
-            <a:endParaRPr lang="en-US" dirty="0"/>
-          </a:p>
-        </p:txBody>
-      </p:sp>
-      <p:sp>
-        <p:nvSpPr>
-          <p:cNvPr id="4" name="Rectangle 3">
-            <a:extLst>
-              <a:ext uri="{FF2B5EF4-FFF2-40B4-BE49-F238E27FC236}">
-                <a16:creationId xmlns:a16="http://schemas.microsoft.com/office/drawing/2014/main" id="{8252FAC5-4990-49E2-A2F6-9ED1220649FD}"/>
-              </a:ext>
-            </a:extLst>
-          </p:cNvPr>
-          <p:cNvSpPr/>
-          <p:nvPr/>
-        </p:nvSpPr>
-        <p:spPr>
-          <a:xfrm>
-            <a:off x="622998" y="3006131"/>
-            <a:ext cx="3788228" cy="1457011"/>
-          </a:xfrm>
-          <a:custGeom>
-            <a:avLst/>
-            <a:gdLst>
-              <a:gd name="connsiteX0" fmla="*/ 0 w 3788228"/>
-              <a:gd name="connsiteY0" fmla="*/ 0 h 1457011"/>
-              <a:gd name="connsiteX1" fmla="*/ 593489 w 3788228"/>
-              <a:gd name="connsiteY1" fmla="*/ 0 h 1457011"/>
-              <a:gd name="connsiteX2" fmla="*/ 1111214 w 3788228"/>
-              <a:gd name="connsiteY2" fmla="*/ 0 h 1457011"/>
-              <a:gd name="connsiteX3" fmla="*/ 1818349 w 3788228"/>
-              <a:gd name="connsiteY3" fmla="*/ 0 h 1457011"/>
-              <a:gd name="connsiteX4" fmla="*/ 2411838 w 3788228"/>
-              <a:gd name="connsiteY4" fmla="*/ 0 h 1457011"/>
-              <a:gd name="connsiteX5" fmla="*/ 3005328 w 3788228"/>
-              <a:gd name="connsiteY5" fmla="*/ 0 h 1457011"/>
-              <a:gd name="connsiteX6" fmla="*/ 3788228 w 3788228"/>
-              <a:gd name="connsiteY6" fmla="*/ 0 h 1457011"/>
-              <a:gd name="connsiteX7" fmla="*/ 3788228 w 3788228"/>
-              <a:gd name="connsiteY7" fmla="*/ 456530 h 1457011"/>
-              <a:gd name="connsiteX8" fmla="*/ 3788228 w 3788228"/>
-              <a:gd name="connsiteY8" fmla="*/ 942200 h 1457011"/>
-              <a:gd name="connsiteX9" fmla="*/ 3788228 w 3788228"/>
-              <a:gd name="connsiteY9" fmla="*/ 1457011 h 1457011"/>
-              <a:gd name="connsiteX10" fmla="*/ 3232621 w 3788228"/>
-              <a:gd name="connsiteY10" fmla="*/ 1457011 h 1457011"/>
-              <a:gd name="connsiteX11" fmla="*/ 2601250 w 3788228"/>
-              <a:gd name="connsiteY11" fmla="*/ 1457011 h 1457011"/>
-              <a:gd name="connsiteX12" fmla="*/ 2007761 w 3788228"/>
-              <a:gd name="connsiteY12" fmla="*/ 1457011 h 1457011"/>
-              <a:gd name="connsiteX13" fmla="*/ 1300625 w 3788228"/>
-              <a:gd name="connsiteY13" fmla="*/ 1457011 h 1457011"/>
-              <a:gd name="connsiteX14" fmla="*/ 593489 w 3788228"/>
-              <a:gd name="connsiteY14" fmla="*/ 1457011 h 1457011"/>
-              <a:gd name="connsiteX15" fmla="*/ 0 w 3788228"/>
-              <a:gd name="connsiteY15" fmla="*/ 1457011 h 1457011"/>
-              <a:gd name="connsiteX16" fmla="*/ 0 w 3788228"/>
-              <a:gd name="connsiteY16" fmla="*/ 971341 h 1457011"/>
-              <a:gd name="connsiteX17" fmla="*/ 0 w 3788228"/>
-              <a:gd name="connsiteY17" fmla="*/ 500240 h 1457011"/>
-              <a:gd name="connsiteX18" fmla="*/ 0 w 3788228"/>
-              <a:gd name="connsiteY18" fmla="*/ 0 h 1457011"/>
-            </a:gdLst>
-            <a:ahLst/>
-            <a:cxnLst>
-              <a:cxn ang="0">
-                <a:pos x="connsiteX0" y="connsiteY0"/>
-              </a:cxn>
-              <a:cxn ang="0">
-                <a:pos x="connsiteX1" y="connsiteY1"/>
-              </a:cxn>
-              <a:cxn ang="0">
-                <a:pos x="connsiteX2" y="connsiteY2"/>
-              </a:cxn>
-              <a:cxn ang="0">
-                <a:pos x="connsiteX3" y="connsiteY3"/>
-              </a:cxn>
-              <a:cxn ang="0">
-                <a:pos x="connsiteX4" y="connsiteY4"/>
-              </a:cxn>
-              <a:cxn ang="0">
-                <a:pos x="connsiteX5" y="connsiteY5"/>
-              </a:cxn>
-              <a:cxn ang="0">
-                <a:pos x="connsiteX6" y="connsiteY6"/>
-              </a:cxn>
-              <a:cxn ang="0">
-                <a:pos x="connsiteX7" y="connsiteY7"/>
-              </a:cxn>
-              <a:cxn ang="0">
-                <a:pos x="connsiteX8" y="connsiteY8"/>
-              </a:cxn>
-              <a:cxn ang="0">
-                <a:pos x="connsiteX9" y="connsiteY9"/>
-              </a:cxn>
-              <a:cxn ang="0">
-                <a:pos x="connsiteX10" y="connsiteY10"/>
-              </a:cxn>
-              <a:cxn ang="0">
-                <a:pos x="connsiteX11" y="connsiteY11"/>
-              </a:cxn>
-              <a:cxn ang="0">
-                <a:pos x="connsiteX12" y="connsiteY12"/>
-              </a:cxn>
-              <a:cxn ang="0">
-                <a:pos x="connsiteX13" y="connsiteY13"/>
-              </a:cxn>
-              <a:cxn ang="0">
-                <a:pos x="connsiteX14" y="connsiteY14"/>
-              </a:cxn>
-              <a:cxn ang="0">
-                <a:pos x="connsiteX15" y="connsiteY15"/>
-              </a:cxn>
-              <a:cxn ang="0">
-                <a:pos x="connsiteX16" y="connsiteY16"/>
-              </a:cxn>
-              <a:cxn ang="0">
-                <a:pos x="connsiteX17" y="connsiteY17"/>
-              </a:cxn>
-              <a:cxn ang="0">
-                <a:pos x="connsiteX18" y="connsiteY18"/>
-              </a:cxn>
-            </a:cxnLst>
-            <a:rect l="l" t="t" r="r" b="b"/>
-            <a:pathLst>
-              <a:path w="3788228" h="1457011" extrusionOk="0">
-                <a:moveTo>
-                  <a:pt x="0" y="0"/>
-                </a:moveTo>
-                <a:cubicBezTo>
-                  <a:pt x="287109" y="-16378"/>
-                  <a:pt x="367211" y="1011"/>
-                  <a:pt x="593489" y="0"/>
-                </a:cubicBezTo>
-                <a:cubicBezTo>
-                  <a:pt x="819767" y="-1011"/>
-                  <a:pt x="912247" y="-3035"/>
-                  <a:pt x="1111214" y="0"/>
-                </a:cubicBezTo>
-                <a:cubicBezTo>
-                  <a:pt x="1310182" y="3035"/>
-                  <a:pt x="1579259" y="-30071"/>
-                  <a:pt x="1818349" y="0"/>
-                </a:cubicBezTo>
-                <a:cubicBezTo>
-                  <a:pt x="2057439" y="30071"/>
-                  <a:pt x="2199489" y="-22663"/>
-                  <a:pt x="2411838" y="0"/>
-                </a:cubicBezTo>
-                <a:cubicBezTo>
-                  <a:pt x="2624187" y="22663"/>
-                  <a:pt x="2802775" y="17073"/>
-                  <a:pt x="3005328" y="0"/>
-                </a:cubicBezTo>
-                <a:cubicBezTo>
-                  <a:pt x="3207881" y="-17073"/>
-                  <a:pt x="3495250" y="18076"/>
-                  <a:pt x="3788228" y="0"/>
-                </a:cubicBezTo>
-                <a:cubicBezTo>
-                  <a:pt x="3777143" y="186787"/>
-                  <a:pt x="3801991" y="234624"/>
-                  <a:pt x="3788228" y="456530"/>
-                </a:cubicBezTo>
-                <a:cubicBezTo>
-                  <a:pt x="3774466" y="678436"/>
-                  <a:pt x="3801296" y="813278"/>
-                  <a:pt x="3788228" y="942200"/>
-                </a:cubicBezTo>
-                <a:cubicBezTo>
-                  <a:pt x="3775161" y="1071122"/>
-                  <a:pt x="3811909" y="1272088"/>
-                  <a:pt x="3788228" y="1457011"/>
-                </a:cubicBezTo>
-                <a:cubicBezTo>
-                  <a:pt x="3674859" y="1465907"/>
-                  <a:pt x="3490065" y="1474275"/>
-                  <a:pt x="3232621" y="1457011"/>
-                </a:cubicBezTo>
-                <a:cubicBezTo>
-                  <a:pt x="2975177" y="1439747"/>
-                  <a:pt x="2737574" y="1435173"/>
-                  <a:pt x="2601250" y="1457011"/>
-                </a:cubicBezTo>
-                <a:cubicBezTo>
-                  <a:pt x="2464926" y="1478849"/>
-                  <a:pt x="2167441" y="1458320"/>
-                  <a:pt x="2007761" y="1457011"/>
-                </a:cubicBezTo>
-                <a:cubicBezTo>
-                  <a:pt x="1848081" y="1455702"/>
-                  <a:pt x="1570731" y="1439932"/>
-                  <a:pt x="1300625" y="1457011"/>
-                </a:cubicBezTo>
-                <a:cubicBezTo>
-                  <a:pt x="1030519" y="1474090"/>
-                  <a:pt x="822594" y="1489053"/>
-                  <a:pt x="593489" y="1457011"/>
-                </a:cubicBezTo>
-                <a:cubicBezTo>
-                  <a:pt x="364384" y="1424969"/>
-                  <a:pt x="144176" y="1437305"/>
-                  <a:pt x="0" y="1457011"/>
-                </a:cubicBezTo>
-                <a:cubicBezTo>
-                  <a:pt x="5687" y="1270173"/>
-                  <a:pt x="-7054" y="1153697"/>
-                  <a:pt x="0" y="971341"/>
-                </a:cubicBezTo>
-                <a:cubicBezTo>
-                  <a:pt x="7054" y="788985"/>
-                  <a:pt x="-4821" y="633983"/>
-                  <a:pt x="0" y="500240"/>
-                </a:cubicBezTo>
-                <a:cubicBezTo>
-                  <a:pt x="4821" y="366497"/>
-                  <a:pt x="1292" y="242710"/>
-                  <a:pt x="0" y="0"/>
-                </a:cubicBezTo>
-                <a:close/>
-              </a:path>
-            </a:pathLst>
-          </a:custGeom>
-          <a:noFill/>
-          <a:ln w="127000">
-            <a:solidFill>
-              <a:srgbClr val="FFFF00"/>
-            </a:solidFill>
-            <a:prstDash val="solid"/>
-            <a:extLst>
-              <a:ext uri="{C807C97D-BFC1-408E-A445-0C87EB9F89A2}">
-                <ask:lineSketchStyleProps xmlns:ask="http://schemas.microsoft.com/office/drawing/2018/sketchyshapes" sd="1219033472">
-                  <a:prstGeom prst="rect">
-                    <a:avLst/>
-                  </a:prstGeom>
-                  <ask:type>
-                    <ask:lineSketchFreehand/>
-                  </ask:type>
-                </ask:lineSketchStyleProps>
-              </a:ext>
-            </a:extLst>
-          </a:ln>
-        </p:spPr>
-        <p:style>
-          <a:lnRef idx="2">
-            <a:schemeClr val="accent1">
-              <a:shade val="50000"/>
-            </a:schemeClr>
-          </a:lnRef>
-          <a:fillRef idx="1">
-            <a:schemeClr val="accent1"/>
-          </a:fillRef>
-          <a:effectRef idx="0">
-            <a:schemeClr val="accent1"/>
-          </a:effectRef>
-          <a:fontRef idx="minor">
-            <a:schemeClr val="lt1"/>
-          </a:fontRef>
-        </p:style>
-        <p:txBody>
-          <a:bodyPr rtlCol="0" anchor="ctr"/>
-          <a:lstStyle/>
-          <a:p>
-            <a:pPr algn="ctr"/>
-            <a:endParaRPr lang="en-US"/>
-          </a:p>
-        </p:txBody>
-      </p:sp>
-    </p:spTree>
-    <p:extLst>
-      <p:ext uri="{BB962C8B-B14F-4D97-AF65-F5344CB8AC3E}">
-        <p14:creationId xmlns:p14="http://schemas.microsoft.com/office/powerpoint/2010/main" val="2852839510"/>
-      </p:ext>
-    </p:extLst>
-  </p:cSld>
-  <p:clrMapOvr>
-    <a:masterClrMapping/>
-  </p:clrMapOvr>
-  <p:timing>
-    <p:tnLst>
-      <p:par>
-        <p:cTn id="1" dur="indefinite" restart="never" nodeType="tmRoot">
-          <p:childTnLst>
-            <p:seq concurrent="1" nextAc="seek">
-              <p:cTn id="2" dur="indefinite" nodeType="mainSeq">
-                <p:childTnLst>
-                  <p:par>
-                    <p:cTn id="3" fill="hold">
-                      <p:stCondLst>
-                        <p:cond delay="indefinite"/>
-                      </p:stCondLst>
-                      <p:childTnLst>
-                        <p:par>
-                          <p:cTn id="4" fill="hold">
-                            <p:stCondLst>
-                              <p:cond delay="0"/>
-                            </p:stCondLst>
-                            <p:childTnLst>
-                              <p:par>
-                                <p:cTn id="5" presetID="10" presetClass="entr" presetSubtype="0" fill="hold" grpId="0" nodeType="clickEffect">
-                                  <p:stCondLst>
-                                    <p:cond delay="0"/>
-                                  </p:stCondLst>
-                                  <p:childTnLst>
-                                    <p:set>
-                                      <p:cBhvr>
-                                        <p:cTn id="6" dur="1" fill="hold">
-                                          <p:stCondLst>
-                                            <p:cond delay="0"/>
-                                          </p:stCondLst>
-                                        </p:cTn>
-                                        <p:tgtEl>
-                                          <p:spTgt spid="4"/>
-                                        </p:tgtEl>
-                                        <p:attrNameLst>
-                                          <p:attrName>style.visibility</p:attrName>
-                                        </p:attrNameLst>
-                                      </p:cBhvr>
-                                      <p:to>
-                                        <p:strVal val="visible"/>
-                                      </p:to>
-                                    </p:set>
-                                    <p:animEffect transition="in" filter="fade">
-                                      <p:cBhvr>
-                                        <p:cTn id="7" dur="500"/>
-                                        <p:tgtEl>
-                                          <p:spTgt spid="4"/>
-                                        </p:tgtEl>
-                                      </p:cBhvr>
-                                    </p:animEffect>
-                                  </p:childTnLst>
-                                </p:cTn>
-                              </p:par>
-                            </p:childTnLst>
-                          </p:cTn>
-                        </p:par>
-                      </p:childTnLst>
-                    </p:cTn>
-                  </p:par>
-                </p:childTnLst>
-              </p:cTn>
-              <p:prevCondLst>
-                <p:cond evt="onPrev" delay="0">
-                  <p:tgtEl>
-                    <p:sldTgt/>
-                  </p:tgtEl>
-                </p:cond>
-              </p:prevCondLst>
-              <p:nextCondLst>
-                <p:cond evt="onNext" delay="0">
-                  <p:tgtEl>
-                    <p:sldTgt/>
-                  </p:tgtEl>
-                </p:cond>
-              </p:nextCondLst>
-            </p:seq>
-          </p:childTnLst>
-        </p:cTn>
-      </p:par>
-    </p:tnLst>
-    <p:bldLst>
-      <p:bldP spid="4" grpId="0" animBg="1"/>
-    </p:bldLst>
-  </p:timing>
-</p:sld>
-</file>
-
-<file path=ppt/slides/slide7.xml><?xml version="1.0" encoding="utf-8"?>
-<p:sld xmlns:a="http://schemas.openxmlformats.org/drawingml/2006/main" xmlns:r="http://schemas.openxmlformats.org/officeDocument/2006/relationships" xmlns:p="http://schemas.openxmlformats.org/presentationml/2006/main">
-  <p:cSld>
-    <p:spTree>
-      <p:nvGrpSpPr>
-        <p:cNvPr id="1" name="Shape 657"/>
-        <p:cNvGrpSpPr/>
-        <p:nvPr/>
-      </p:nvGrpSpPr>
-      <p:grpSpPr>
-        <a:xfrm>
-          <a:off x="0" y="0"/>
-          <a:ext cx="0" cy="0"/>
-          <a:chOff x="0" y="0"/>
-          <a:chExt cx="0" cy="0"/>
-        </a:xfrm>
-      </p:grpSpPr>
-      <p:sp>
-        <p:nvSpPr>
-          <p:cNvPr id="658" name="Google Shape;658;p39"/>
-          <p:cNvSpPr txBox="1">
-            <a:spLocks noGrp="1"/>
-          </p:cNvSpPr>
-          <p:nvPr>
-            <p:ph type="title"/>
-          </p:nvPr>
-        </p:nvSpPr>
-        <p:spPr>
-          <a:xfrm>
             <a:off x="797360" y="441581"/>
             <a:ext cx="7549280" cy="477552"/>
           </a:xfrm>
@@ -16042,7 +14462,7 @@
 </p:sld>
 </file>
 
-<file path=ppt/slides/slide8.xml><?xml version="1.0" encoding="utf-8"?>
+<file path=ppt/slides/slide7.xml><?xml version="1.0" encoding="utf-8"?>
 <p:sld xmlns:a="http://schemas.openxmlformats.org/drawingml/2006/main" xmlns:r="http://schemas.openxmlformats.org/officeDocument/2006/relationships" xmlns:p="http://schemas.openxmlformats.org/presentationml/2006/main">
   <p:cSld>
     <p:spTree>
@@ -16749,7 +15169,7 @@
 </p:sld>
 </file>
 
-<file path=ppt/slides/slide9.xml><?xml version="1.0" encoding="utf-8"?>
+<file path=ppt/slides/slide8.xml><?xml version="1.0" encoding="utf-8"?>
 <p:sld xmlns:a="http://schemas.openxmlformats.org/drawingml/2006/main" xmlns:r="http://schemas.openxmlformats.org/officeDocument/2006/relationships" xmlns:p="http://schemas.openxmlformats.org/presentationml/2006/main">
   <p:cSld>
     <p:spTree>
@@ -17329,6 +15749,759 @@
     <p:extLst>
       <p:ext uri="{BB962C8B-B14F-4D97-AF65-F5344CB8AC3E}">
         <p14:creationId xmlns:p14="http://schemas.microsoft.com/office/powerpoint/2010/main" val="771270554"/>
+      </p:ext>
+    </p:extLst>
+  </p:cSld>
+  <p:clrMapOvr>
+    <a:masterClrMapping/>
+  </p:clrMapOvr>
+  <p:timing>
+    <p:tnLst>
+      <p:par>
+        <p:cTn id="1" dur="indefinite" restart="never" nodeType="tmRoot">
+          <p:childTnLst>
+            <p:seq concurrent="1" nextAc="seek">
+              <p:cTn id="2" dur="indefinite" nodeType="mainSeq">
+                <p:childTnLst>
+                  <p:par>
+                    <p:cTn id="3" fill="hold">
+                      <p:stCondLst>
+                        <p:cond delay="indefinite"/>
+                      </p:stCondLst>
+                      <p:childTnLst>
+                        <p:par>
+                          <p:cTn id="4" fill="hold">
+                            <p:stCondLst>
+                              <p:cond delay="0"/>
+                            </p:stCondLst>
+                            <p:childTnLst>
+                              <p:par>
+                                <p:cTn id="5" presetID="10" presetClass="entr" presetSubtype="0" fill="hold" grpId="0" nodeType="clickEffect">
+                                  <p:stCondLst>
+                                    <p:cond delay="0"/>
+                                  </p:stCondLst>
+                                  <p:childTnLst>
+                                    <p:set>
+                                      <p:cBhvr>
+                                        <p:cTn id="6" dur="1" fill="hold">
+                                          <p:stCondLst>
+                                            <p:cond delay="0"/>
+                                          </p:stCondLst>
+                                        </p:cTn>
+                                        <p:tgtEl>
+                                          <p:spTgt spid="4"/>
+                                        </p:tgtEl>
+                                        <p:attrNameLst>
+                                          <p:attrName>style.visibility</p:attrName>
+                                        </p:attrNameLst>
+                                      </p:cBhvr>
+                                      <p:to>
+                                        <p:strVal val="visible"/>
+                                      </p:to>
+                                    </p:set>
+                                    <p:animEffect transition="in" filter="fade">
+                                      <p:cBhvr>
+                                        <p:cTn id="7" dur="500"/>
+                                        <p:tgtEl>
+                                          <p:spTgt spid="4"/>
+                                        </p:tgtEl>
+                                      </p:cBhvr>
+                                    </p:animEffect>
+                                  </p:childTnLst>
+                                </p:cTn>
+                              </p:par>
+                            </p:childTnLst>
+                          </p:cTn>
+                        </p:par>
+                      </p:childTnLst>
+                    </p:cTn>
+                  </p:par>
+                </p:childTnLst>
+              </p:cTn>
+              <p:prevCondLst>
+                <p:cond evt="onPrev" delay="0">
+                  <p:tgtEl>
+                    <p:sldTgt/>
+                  </p:tgtEl>
+                </p:cond>
+              </p:prevCondLst>
+              <p:nextCondLst>
+                <p:cond evt="onNext" delay="0">
+                  <p:tgtEl>
+                    <p:sldTgt/>
+                  </p:tgtEl>
+                </p:cond>
+              </p:nextCondLst>
+            </p:seq>
+          </p:childTnLst>
+        </p:cTn>
+      </p:par>
+    </p:tnLst>
+    <p:bldLst>
+      <p:bldP spid="4" grpId="0" animBg="1"/>
+    </p:bldLst>
+  </p:timing>
+</p:sld>
+</file>
+
+<file path=ppt/slides/slide9.xml><?xml version="1.0" encoding="utf-8"?>
+<p:sld xmlns:a="http://schemas.openxmlformats.org/drawingml/2006/main" xmlns:r="http://schemas.openxmlformats.org/officeDocument/2006/relationships" xmlns:p="http://schemas.openxmlformats.org/presentationml/2006/main">
+  <p:cSld>
+    <p:spTree>
+      <p:nvGrpSpPr>
+        <p:cNvPr id="1" name="Shape 657"/>
+        <p:cNvGrpSpPr/>
+        <p:nvPr/>
+      </p:nvGrpSpPr>
+      <p:grpSpPr>
+        <a:xfrm>
+          <a:off x="0" y="0"/>
+          <a:ext cx="0" cy="0"/>
+          <a:chOff x="0" y="0"/>
+          <a:chExt cx="0" cy="0"/>
+        </a:xfrm>
+      </p:grpSpPr>
+      <p:sp>
+        <p:nvSpPr>
+          <p:cNvPr id="658" name="Google Shape;658;p39"/>
+          <p:cNvSpPr txBox="1">
+            <a:spLocks noGrp="1"/>
+          </p:cNvSpPr>
+          <p:nvPr>
+            <p:ph type="title"/>
+          </p:nvPr>
+        </p:nvSpPr>
+        <p:spPr>
+          <a:xfrm>
+            <a:off x="678643" y="511568"/>
+            <a:ext cx="7980675" cy="477552"/>
+          </a:xfrm>
+          <a:prstGeom prst="rect">
+            <a:avLst/>
+          </a:prstGeom>
+        </p:spPr>
+        <p:txBody>
+          <a:bodyPr spcFirstLastPara="1" wrap="square" lIns="91425" tIns="91425" rIns="91425" bIns="91425" anchor="t" anchorCtr="0">
+            <a:noAutofit/>
+          </a:bodyPr>
+          <a:lstStyle/>
+          <a:p>
+            <a:pPr lvl="0"/>
+            <a:r>
+              <a:rPr lang="en-US" sz="1600" dirty="0"/>
+              <a:t>Which CSS selector could select this element in CSS?</a:t>
+            </a:r>
+          </a:p>
+        </p:txBody>
+      </p:sp>
+      <p:sp>
+        <p:nvSpPr>
+          <p:cNvPr id="3" name="Rectangle 2">
+            <a:extLst>
+              <a:ext uri="{FF2B5EF4-FFF2-40B4-BE49-F238E27FC236}">
+                <a16:creationId xmlns:a16="http://schemas.microsoft.com/office/drawing/2014/main" id="{3164A431-FFA0-4BAC-9181-B8C0248E5E58}"/>
+              </a:ext>
+            </a:extLst>
+          </p:cNvPr>
+          <p:cNvSpPr/>
+          <p:nvPr/>
+        </p:nvSpPr>
+        <p:spPr>
+          <a:xfrm>
+            <a:off x="622997" y="2833633"/>
+            <a:ext cx="3788228" cy="696267"/>
+          </a:xfrm>
+          <a:prstGeom prst="rect">
+            <a:avLst/>
+          </a:prstGeom>
+        </p:spPr>
+        <p:style>
+          <a:lnRef idx="2">
+            <a:schemeClr val="accent1">
+              <a:shade val="50000"/>
+            </a:schemeClr>
+          </a:lnRef>
+          <a:fillRef idx="1">
+            <a:schemeClr val="accent1"/>
+          </a:fillRef>
+          <a:effectRef idx="0">
+            <a:schemeClr val="accent1"/>
+          </a:effectRef>
+          <a:fontRef idx="minor">
+            <a:schemeClr val="lt1"/>
+          </a:fontRef>
+        </p:style>
+        <p:txBody>
+          <a:bodyPr rtlCol="0" anchor="ctr"/>
+          <a:lstStyle/>
+          <a:p>
+            <a:pPr algn="ctr"/>
+            <a:r>
+              <a:rPr kumimoji="0" lang="en-US" sz="2800" b="1" i="0" u="none" strike="noStrike" kern="0" cap="none" spc="0" normalizeH="0" baseline="0" noProof="0" dirty="0">
+                <a:ln>
+                  <a:noFill/>
+                </a:ln>
+                <a:solidFill>
+                  <a:srgbClr val="000000"/>
+                </a:solidFill>
+                <a:effectLst/>
+                <a:uLnTx/>
+                <a:uFillTx/>
+                <a:latin typeface="Krona One"/>
+                <a:sym typeface="Krona One"/>
+              </a:rPr>
+              <a:t>A. .h1</a:t>
+            </a:r>
+            <a:endParaRPr lang="en-US" dirty="0"/>
+          </a:p>
+        </p:txBody>
+      </p:sp>
+      <p:sp>
+        <p:nvSpPr>
+          <p:cNvPr id="8" name="Rectangle 7">
+            <a:extLst>
+              <a:ext uri="{FF2B5EF4-FFF2-40B4-BE49-F238E27FC236}">
+                <a16:creationId xmlns:a16="http://schemas.microsoft.com/office/drawing/2014/main" id="{14616292-B763-4E75-9FDE-B667351A134B}"/>
+              </a:ext>
+            </a:extLst>
+          </p:cNvPr>
+          <p:cNvSpPr/>
+          <p:nvPr/>
+        </p:nvSpPr>
+        <p:spPr>
+          <a:xfrm>
+            <a:off x="4732774" y="2833633"/>
+            <a:ext cx="3788228" cy="696267"/>
+          </a:xfrm>
+          <a:prstGeom prst="rect">
+            <a:avLst/>
+          </a:prstGeom>
+        </p:spPr>
+        <p:style>
+          <a:lnRef idx="2">
+            <a:schemeClr val="accent2">
+              <a:shade val="50000"/>
+            </a:schemeClr>
+          </a:lnRef>
+          <a:fillRef idx="1">
+            <a:schemeClr val="accent2"/>
+          </a:fillRef>
+          <a:effectRef idx="0">
+            <a:schemeClr val="accent2"/>
+          </a:effectRef>
+          <a:fontRef idx="minor">
+            <a:schemeClr val="lt1"/>
+          </a:fontRef>
+        </p:style>
+        <p:txBody>
+          <a:bodyPr rtlCol="0" anchor="ctr"/>
+          <a:lstStyle/>
+          <a:p>
+            <a:pPr algn="ctr"/>
+            <a:r>
+              <a:rPr kumimoji="0" lang="en-US" sz="2800" b="1" i="0" u="none" strike="noStrike" kern="0" cap="none" spc="0" normalizeH="0" baseline="0" noProof="0" dirty="0">
+                <a:ln>
+                  <a:noFill/>
+                </a:ln>
+                <a:solidFill>
+                  <a:srgbClr val="000000"/>
+                </a:solidFill>
+                <a:effectLst/>
+                <a:uLnTx/>
+                <a:uFillTx/>
+                <a:latin typeface="Krona One"/>
+                <a:sym typeface="Krona One"/>
+              </a:rPr>
+              <a:t>B. .large</a:t>
+            </a:r>
+            <a:endParaRPr lang="en-US" dirty="0"/>
+          </a:p>
+        </p:txBody>
+      </p:sp>
+      <p:sp>
+        <p:nvSpPr>
+          <p:cNvPr id="9" name="Rectangle 8">
+            <a:extLst>
+              <a:ext uri="{FF2B5EF4-FFF2-40B4-BE49-F238E27FC236}">
+                <a16:creationId xmlns:a16="http://schemas.microsoft.com/office/drawing/2014/main" id="{3A325A3C-013D-4AEC-B7D3-B9F83FC398EA}"/>
+              </a:ext>
+            </a:extLst>
+          </p:cNvPr>
+          <p:cNvSpPr/>
+          <p:nvPr/>
+        </p:nvSpPr>
+        <p:spPr>
+          <a:xfrm>
+            <a:off x="622998" y="3766876"/>
+            <a:ext cx="3788228" cy="696267"/>
+          </a:xfrm>
+          <a:prstGeom prst="rect">
+            <a:avLst/>
+          </a:prstGeom>
+        </p:spPr>
+        <p:style>
+          <a:lnRef idx="2">
+            <a:schemeClr val="accent3">
+              <a:shade val="50000"/>
+            </a:schemeClr>
+          </a:lnRef>
+          <a:fillRef idx="1">
+            <a:schemeClr val="accent3"/>
+          </a:fillRef>
+          <a:effectRef idx="0">
+            <a:schemeClr val="accent3"/>
+          </a:effectRef>
+          <a:fontRef idx="minor">
+            <a:schemeClr val="lt1"/>
+          </a:fontRef>
+        </p:style>
+        <p:txBody>
+          <a:bodyPr rtlCol="0" anchor="ctr"/>
+          <a:lstStyle/>
+          <a:p>
+            <a:pPr algn="ctr"/>
+            <a:r>
+              <a:rPr kumimoji="0" lang="en-US" sz="2800" b="1" i="0" u="none" strike="noStrike" kern="0" cap="none" spc="0" normalizeH="0" baseline="0" noProof="0" dirty="0">
+                <a:ln>
+                  <a:noFill/>
+                </a:ln>
+                <a:solidFill>
+                  <a:srgbClr val="000000"/>
+                </a:solidFill>
+                <a:effectLst/>
+                <a:uLnTx/>
+                <a:uFillTx/>
+                <a:latin typeface="Krona One"/>
+                <a:sym typeface="Krona One"/>
+              </a:rPr>
+              <a:t>C. .Big H2</a:t>
+            </a:r>
+            <a:endParaRPr lang="en-US" dirty="0"/>
+          </a:p>
+        </p:txBody>
+      </p:sp>
+      <p:sp>
+        <p:nvSpPr>
+          <p:cNvPr id="10" name="Rectangle 9">
+            <a:extLst>
+              <a:ext uri="{FF2B5EF4-FFF2-40B4-BE49-F238E27FC236}">
+                <a16:creationId xmlns:a16="http://schemas.microsoft.com/office/drawing/2014/main" id="{1555D6F1-AFE4-4EDF-BC8B-4F3C9ACD659F}"/>
+              </a:ext>
+            </a:extLst>
+          </p:cNvPr>
+          <p:cNvSpPr/>
+          <p:nvPr/>
+        </p:nvSpPr>
+        <p:spPr>
+          <a:xfrm>
+            <a:off x="4732774" y="3766875"/>
+            <a:ext cx="3788228" cy="696267"/>
+          </a:xfrm>
+          <a:prstGeom prst="rect">
+            <a:avLst/>
+          </a:prstGeom>
+          <a:solidFill>
+            <a:schemeClr val="accent4">
+              <a:lumMod val="20000"/>
+              <a:lumOff val="80000"/>
+            </a:schemeClr>
+          </a:solidFill>
+          <a:ln>
+            <a:solidFill>
+              <a:schemeClr val="accent4">
+                <a:lumMod val="60000"/>
+                <a:lumOff val="40000"/>
+              </a:schemeClr>
+            </a:solidFill>
+          </a:ln>
+        </p:spPr>
+        <p:style>
+          <a:lnRef idx="2">
+            <a:schemeClr val="accent4">
+              <a:shade val="50000"/>
+            </a:schemeClr>
+          </a:lnRef>
+          <a:fillRef idx="1">
+            <a:schemeClr val="accent4"/>
+          </a:fillRef>
+          <a:effectRef idx="0">
+            <a:schemeClr val="accent4"/>
+          </a:effectRef>
+          <a:fontRef idx="minor">
+            <a:schemeClr val="lt1"/>
+          </a:fontRef>
+        </p:style>
+        <p:txBody>
+          <a:bodyPr rtlCol="0" anchor="ctr"/>
+          <a:lstStyle/>
+          <a:p>
+            <a:pPr algn="ctr"/>
+            <a:r>
+              <a:rPr kumimoji="0" lang="en-US" sz="2800" b="1" i="0" u="none" strike="noStrike" kern="0" cap="none" spc="0" normalizeH="0" baseline="0" noProof="0" dirty="0">
+                <a:ln>
+                  <a:noFill/>
+                </a:ln>
+                <a:solidFill>
+                  <a:srgbClr val="000000"/>
+                </a:solidFill>
+                <a:effectLst/>
+                <a:uLnTx/>
+                <a:uFillTx/>
+                <a:latin typeface="Krona One"/>
+                <a:sym typeface="Krona One"/>
+              </a:rPr>
+              <a:t>D. #large</a:t>
+            </a:r>
+            <a:endParaRPr lang="en-US" dirty="0"/>
+          </a:p>
+        </p:txBody>
+      </p:sp>
+      <p:sp>
+        <p:nvSpPr>
+          <p:cNvPr id="4" name="Rectangle 3">
+            <a:extLst>
+              <a:ext uri="{FF2B5EF4-FFF2-40B4-BE49-F238E27FC236}">
+                <a16:creationId xmlns:a16="http://schemas.microsoft.com/office/drawing/2014/main" id="{8252FAC5-4990-49E2-A2F6-9ED1220649FD}"/>
+              </a:ext>
+            </a:extLst>
+          </p:cNvPr>
+          <p:cNvSpPr/>
+          <p:nvPr/>
+        </p:nvSpPr>
+        <p:spPr>
+          <a:xfrm>
+            <a:off x="4732774" y="2833633"/>
+            <a:ext cx="3788228" cy="687434"/>
+          </a:xfrm>
+          <a:custGeom>
+            <a:avLst/>
+            <a:gdLst>
+              <a:gd name="connsiteX0" fmla="*/ 0 w 3788228"/>
+              <a:gd name="connsiteY0" fmla="*/ 0 h 687434"/>
+              <a:gd name="connsiteX1" fmla="*/ 593489 w 3788228"/>
+              <a:gd name="connsiteY1" fmla="*/ 0 h 687434"/>
+              <a:gd name="connsiteX2" fmla="*/ 1111214 w 3788228"/>
+              <a:gd name="connsiteY2" fmla="*/ 0 h 687434"/>
+              <a:gd name="connsiteX3" fmla="*/ 1818349 w 3788228"/>
+              <a:gd name="connsiteY3" fmla="*/ 0 h 687434"/>
+              <a:gd name="connsiteX4" fmla="*/ 2411838 w 3788228"/>
+              <a:gd name="connsiteY4" fmla="*/ 0 h 687434"/>
+              <a:gd name="connsiteX5" fmla="*/ 3005328 w 3788228"/>
+              <a:gd name="connsiteY5" fmla="*/ 0 h 687434"/>
+              <a:gd name="connsiteX6" fmla="*/ 3788228 w 3788228"/>
+              <a:gd name="connsiteY6" fmla="*/ 0 h 687434"/>
+              <a:gd name="connsiteX7" fmla="*/ 3788228 w 3788228"/>
+              <a:gd name="connsiteY7" fmla="*/ 687434 h 687434"/>
+              <a:gd name="connsiteX8" fmla="*/ 3156857 w 3788228"/>
+              <a:gd name="connsiteY8" fmla="*/ 687434 h 687434"/>
+              <a:gd name="connsiteX9" fmla="*/ 2639132 w 3788228"/>
+              <a:gd name="connsiteY9" fmla="*/ 687434 h 687434"/>
+              <a:gd name="connsiteX10" fmla="*/ 2007761 w 3788228"/>
+              <a:gd name="connsiteY10" fmla="*/ 687434 h 687434"/>
+              <a:gd name="connsiteX11" fmla="*/ 1376390 w 3788228"/>
+              <a:gd name="connsiteY11" fmla="*/ 687434 h 687434"/>
+              <a:gd name="connsiteX12" fmla="*/ 782900 w 3788228"/>
+              <a:gd name="connsiteY12" fmla="*/ 687434 h 687434"/>
+              <a:gd name="connsiteX13" fmla="*/ 0 w 3788228"/>
+              <a:gd name="connsiteY13" fmla="*/ 687434 h 687434"/>
+              <a:gd name="connsiteX14" fmla="*/ 0 w 3788228"/>
+              <a:gd name="connsiteY14" fmla="*/ 0 h 687434"/>
+            </a:gdLst>
+            <a:ahLst/>
+            <a:cxnLst>
+              <a:cxn ang="0">
+                <a:pos x="connsiteX0" y="connsiteY0"/>
+              </a:cxn>
+              <a:cxn ang="0">
+                <a:pos x="connsiteX1" y="connsiteY1"/>
+              </a:cxn>
+              <a:cxn ang="0">
+                <a:pos x="connsiteX2" y="connsiteY2"/>
+              </a:cxn>
+              <a:cxn ang="0">
+                <a:pos x="connsiteX3" y="connsiteY3"/>
+              </a:cxn>
+              <a:cxn ang="0">
+                <a:pos x="connsiteX4" y="connsiteY4"/>
+              </a:cxn>
+              <a:cxn ang="0">
+                <a:pos x="connsiteX5" y="connsiteY5"/>
+              </a:cxn>
+              <a:cxn ang="0">
+                <a:pos x="connsiteX6" y="connsiteY6"/>
+              </a:cxn>
+              <a:cxn ang="0">
+                <a:pos x="connsiteX7" y="connsiteY7"/>
+              </a:cxn>
+              <a:cxn ang="0">
+                <a:pos x="connsiteX8" y="connsiteY8"/>
+              </a:cxn>
+              <a:cxn ang="0">
+                <a:pos x="connsiteX9" y="connsiteY9"/>
+              </a:cxn>
+              <a:cxn ang="0">
+                <a:pos x="connsiteX10" y="connsiteY10"/>
+              </a:cxn>
+              <a:cxn ang="0">
+                <a:pos x="connsiteX11" y="connsiteY11"/>
+              </a:cxn>
+              <a:cxn ang="0">
+                <a:pos x="connsiteX12" y="connsiteY12"/>
+              </a:cxn>
+              <a:cxn ang="0">
+                <a:pos x="connsiteX13" y="connsiteY13"/>
+              </a:cxn>
+              <a:cxn ang="0">
+                <a:pos x="connsiteX14" y="connsiteY14"/>
+              </a:cxn>
+            </a:cxnLst>
+            <a:rect l="l" t="t" r="r" b="b"/>
+            <a:pathLst>
+              <a:path w="3788228" h="687434" extrusionOk="0">
+                <a:moveTo>
+                  <a:pt x="0" y="0"/>
+                </a:moveTo>
+                <a:cubicBezTo>
+                  <a:pt x="287109" y="-16378"/>
+                  <a:pt x="367211" y="1011"/>
+                  <a:pt x="593489" y="0"/>
+                </a:cubicBezTo>
+                <a:cubicBezTo>
+                  <a:pt x="819767" y="-1011"/>
+                  <a:pt x="912247" y="-3035"/>
+                  <a:pt x="1111214" y="0"/>
+                </a:cubicBezTo>
+                <a:cubicBezTo>
+                  <a:pt x="1310182" y="3035"/>
+                  <a:pt x="1579259" y="-30071"/>
+                  <a:pt x="1818349" y="0"/>
+                </a:cubicBezTo>
+                <a:cubicBezTo>
+                  <a:pt x="2057439" y="30071"/>
+                  <a:pt x="2199489" y="-22663"/>
+                  <a:pt x="2411838" y="0"/>
+                </a:cubicBezTo>
+                <a:cubicBezTo>
+                  <a:pt x="2624187" y="22663"/>
+                  <a:pt x="2802775" y="17073"/>
+                  <a:pt x="3005328" y="0"/>
+                </a:cubicBezTo>
+                <a:cubicBezTo>
+                  <a:pt x="3207881" y="-17073"/>
+                  <a:pt x="3495250" y="18076"/>
+                  <a:pt x="3788228" y="0"/>
+                </a:cubicBezTo>
+                <a:cubicBezTo>
+                  <a:pt x="3766823" y="162221"/>
+                  <a:pt x="3806156" y="523150"/>
+                  <a:pt x="3788228" y="687434"/>
+                </a:cubicBezTo>
+                <a:cubicBezTo>
+                  <a:pt x="3502728" y="698073"/>
+                  <a:pt x="3340185" y="663617"/>
+                  <a:pt x="3156857" y="687434"/>
+                </a:cubicBezTo>
+                <a:cubicBezTo>
+                  <a:pt x="2973529" y="711251"/>
+                  <a:pt x="2813019" y="709531"/>
+                  <a:pt x="2639132" y="687434"/>
+                </a:cubicBezTo>
+                <a:cubicBezTo>
+                  <a:pt x="2465245" y="665337"/>
+                  <a:pt x="2172834" y="710767"/>
+                  <a:pt x="2007761" y="687434"/>
+                </a:cubicBezTo>
+                <a:cubicBezTo>
+                  <a:pt x="1842688" y="664101"/>
+                  <a:pt x="1512714" y="665596"/>
+                  <a:pt x="1376390" y="687434"/>
+                </a:cubicBezTo>
+                <a:cubicBezTo>
+                  <a:pt x="1240066" y="709272"/>
+                  <a:pt x="945395" y="693339"/>
+                  <a:pt x="782900" y="687434"/>
+                </a:cubicBezTo>
+                <a:cubicBezTo>
+                  <a:pt x="620405" y="681530"/>
+                  <a:pt x="192470" y="706085"/>
+                  <a:pt x="0" y="687434"/>
+                </a:cubicBezTo>
+                <a:cubicBezTo>
+                  <a:pt x="-32086" y="522160"/>
+                  <a:pt x="-25717" y="253293"/>
+                  <a:pt x="0" y="0"/>
+                </a:cubicBezTo>
+                <a:close/>
+              </a:path>
+            </a:pathLst>
+          </a:custGeom>
+          <a:noFill/>
+          <a:ln w="127000">
+            <a:solidFill>
+              <a:srgbClr val="FFFF00"/>
+            </a:solidFill>
+            <a:prstDash val="solid"/>
+            <a:extLst>
+              <a:ext uri="{C807C97D-BFC1-408E-A445-0C87EB9F89A2}">
+                <ask:lineSketchStyleProps xmlns:ask="http://schemas.microsoft.com/office/drawing/2018/sketchyshapes" sd="1219033472">
+                  <a:prstGeom prst="rect">
+                    <a:avLst/>
+                  </a:prstGeom>
+                  <ask:type>
+                    <ask:lineSketchFreehand/>
+                  </ask:type>
+                </ask:lineSketchStyleProps>
+              </a:ext>
+            </a:extLst>
+          </a:ln>
+        </p:spPr>
+        <p:style>
+          <a:lnRef idx="2">
+            <a:schemeClr val="accent1">
+              <a:shade val="50000"/>
+            </a:schemeClr>
+          </a:lnRef>
+          <a:fillRef idx="1">
+            <a:schemeClr val="accent1"/>
+          </a:fillRef>
+          <a:effectRef idx="0">
+            <a:schemeClr val="accent1"/>
+          </a:effectRef>
+          <a:fontRef idx="minor">
+            <a:schemeClr val="lt1"/>
+          </a:fontRef>
+        </p:style>
+        <p:txBody>
+          <a:bodyPr rtlCol="0" anchor="ctr"/>
+          <a:lstStyle/>
+          <a:p>
+            <a:pPr algn="ctr"/>
+            <a:endParaRPr lang="en-US"/>
+          </a:p>
+        </p:txBody>
+      </p:sp>
+      <p:sp>
+        <p:nvSpPr>
+          <p:cNvPr id="11" name="TextBox 10">
+            <a:extLst>
+              <a:ext uri="{FF2B5EF4-FFF2-40B4-BE49-F238E27FC236}">
+                <a16:creationId xmlns:a16="http://schemas.microsoft.com/office/drawing/2014/main" id="{55FF4073-9704-40A4-A4C3-EBF8E2196701}"/>
+              </a:ext>
+            </a:extLst>
+          </p:cNvPr>
+          <p:cNvSpPr txBox="1"/>
+          <p:nvPr/>
+        </p:nvSpPr>
+        <p:spPr>
+          <a:xfrm>
+            <a:off x="758536" y="1699595"/>
+            <a:ext cx="7626927" cy="646331"/>
+          </a:xfrm>
+          <a:prstGeom prst="rect">
+            <a:avLst/>
+          </a:prstGeom>
+          <a:noFill/>
+        </p:spPr>
+        <p:txBody>
+          <a:bodyPr wrap="square">
+            <a:spAutoFit/>
+          </a:bodyPr>
+          <a:lstStyle/>
+          <a:p>
+            <a:r>
+              <a:rPr lang="en-US" sz="3600" b="0" dirty="0">
+                <a:solidFill>
+                  <a:srgbClr val="800000"/>
+                </a:solidFill>
+                <a:effectLst/>
+                <a:latin typeface="Consolas" panose="020B0609020204030204" pitchFamily="49" charset="0"/>
+              </a:rPr>
+              <a:t>&lt;h2</a:t>
+            </a:r>
+            <a:r>
+              <a:rPr lang="en-US" sz="3600" b="0" dirty="0">
+                <a:solidFill>
+                  <a:srgbClr val="000000"/>
+                </a:solidFill>
+                <a:effectLst/>
+                <a:latin typeface="Consolas" panose="020B0609020204030204" pitchFamily="49" charset="0"/>
+              </a:rPr>
+              <a:t> </a:t>
+            </a:r>
+            <a:r>
+              <a:rPr lang="en-US" sz="3600" b="0" dirty="0">
+                <a:solidFill>
+                  <a:srgbClr val="FF0000"/>
+                </a:solidFill>
+                <a:effectLst/>
+                <a:latin typeface="Consolas" panose="020B0609020204030204" pitchFamily="49" charset="0"/>
+              </a:rPr>
+              <a:t>class</a:t>
+            </a:r>
+            <a:r>
+              <a:rPr lang="en-US" sz="3600" b="0" dirty="0">
+                <a:solidFill>
+                  <a:srgbClr val="000000"/>
+                </a:solidFill>
+                <a:effectLst/>
+                <a:latin typeface="Consolas" panose="020B0609020204030204" pitchFamily="49" charset="0"/>
+              </a:rPr>
+              <a:t>=</a:t>
+            </a:r>
+            <a:r>
+              <a:rPr lang="en-US" sz="3600" b="0" dirty="0">
+                <a:solidFill>
+                  <a:srgbClr val="0000FF"/>
+                </a:solidFill>
+                <a:effectLst/>
+                <a:latin typeface="Consolas" panose="020B0609020204030204" pitchFamily="49" charset="0"/>
+              </a:rPr>
+              <a:t>"large"</a:t>
+            </a:r>
+            <a:r>
+              <a:rPr lang="en-US" sz="3600" b="0" dirty="0">
+                <a:solidFill>
+                  <a:srgbClr val="800000"/>
+                </a:solidFill>
+                <a:effectLst/>
+                <a:latin typeface="Consolas" panose="020B0609020204030204" pitchFamily="49" charset="0"/>
+              </a:rPr>
+              <a:t>&gt;</a:t>
+            </a:r>
+            <a:r>
+              <a:rPr lang="en-US" sz="3600" b="0" dirty="0">
+                <a:solidFill>
+                  <a:srgbClr val="000000"/>
+                </a:solidFill>
+                <a:effectLst/>
+                <a:latin typeface="Consolas" panose="020B0609020204030204" pitchFamily="49" charset="0"/>
+              </a:rPr>
+              <a:t>Big H2</a:t>
+            </a:r>
+            <a:r>
+              <a:rPr lang="en-US" sz="3600" b="0" dirty="0">
+                <a:solidFill>
+                  <a:srgbClr val="800000"/>
+                </a:solidFill>
+                <a:effectLst/>
+                <a:latin typeface="Consolas" panose="020B0609020204030204" pitchFamily="49" charset="0"/>
+              </a:rPr>
+              <a:t>&lt;/h2&gt;</a:t>
+            </a:r>
+            <a:endParaRPr lang="en-US" sz="3600" b="0" dirty="0">
+              <a:solidFill>
+                <a:srgbClr val="000000"/>
+              </a:solidFill>
+              <a:effectLst/>
+              <a:latin typeface="Consolas" panose="020B0609020204030204" pitchFamily="49" charset="0"/>
+            </a:endParaRPr>
+          </a:p>
+        </p:txBody>
+      </p:sp>
+    </p:spTree>
+    <p:extLst>
+      <p:ext uri="{BB962C8B-B14F-4D97-AF65-F5344CB8AC3E}">
+        <p14:creationId xmlns:p14="http://schemas.microsoft.com/office/powerpoint/2010/main" val="1819734752"/>
       </p:ext>
     </p:extLst>
   </p:cSld>

</xml_diff>